<commit_message>
updated plots + new dataset (CHORD_COAD)
</commit_message>
<xml_diff>
--- a/docs/mhn_clustering_grafiken.pptx
+++ b/docs/mhn_clustering_grafiken.pptx
@@ -6,6 +6,7 @@
   </p:sldMasterIdLst>
   <p:sldIdLst>
     <p:sldId id="256" r:id="rId2"/>
+    <p:sldId id="257" r:id="rId3"/>
   </p:sldIdLst>
   <p:sldSz cx="12192000" cy="6858000"/>
   <p:notesSz cx="6858000" cy="9144000"/>
@@ -259,7 +260,7 @@
           <a:p>
             <a:fld id="{72F08137-116F-452A-B67D-5625C039EDA3}" type="datetimeFigureOut">
               <a:rPr lang="de-DE" smtClean="0"/>
-              <a:t>05.05.2025</a:t>
+              <a:t>05.07.2025</a:t>
             </a:fld>
             <a:endParaRPr lang="de-DE"/>
           </a:p>
@@ -457,7 +458,7 @@
           <a:p>
             <a:fld id="{72F08137-116F-452A-B67D-5625C039EDA3}" type="datetimeFigureOut">
               <a:rPr lang="de-DE" smtClean="0"/>
-              <a:t>05.05.2025</a:t>
+              <a:t>05.07.2025</a:t>
             </a:fld>
             <a:endParaRPr lang="de-DE"/>
           </a:p>
@@ -665,7 +666,7 @@
           <a:p>
             <a:fld id="{72F08137-116F-452A-B67D-5625C039EDA3}" type="datetimeFigureOut">
               <a:rPr lang="de-DE" smtClean="0"/>
-              <a:t>05.05.2025</a:t>
+              <a:t>05.07.2025</a:t>
             </a:fld>
             <a:endParaRPr lang="de-DE"/>
           </a:p>
@@ -863,7 +864,7 @@
           <a:p>
             <a:fld id="{72F08137-116F-452A-B67D-5625C039EDA3}" type="datetimeFigureOut">
               <a:rPr lang="de-DE" smtClean="0"/>
-              <a:t>05.05.2025</a:t>
+              <a:t>05.07.2025</a:t>
             </a:fld>
             <a:endParaRPr lang="de-DE"/>
           </a:p>
@@ -1138,7 +1139,7 @@
           <a:p>
             <a:fld id="{72F08137-116F-452A-B67D-5625C039EDA3}" type="datetimeFigureOut">
               <a:rPr lang="de-DE" smtClean="0"/>
-              <a:t>05.05.2025</a:t>
+              <a:t>05.07.2025</a:t>
             </a:fld>
             <a:endParaRPr lang="de-DE"/>
           </a:p>
@@ -1403,7 +1404,7 @@
           <a:p>
             <a:fld id="{72F08137-116F-452A-B67D-5625C039EDA3}" type="datetimeFigureOut">
               <a:rPr lang="de-DE" smtClean="0"/>
-              <a:t>05.05.2025</a:t>
+              <a:t>05.07.2025</a:t>
             </a:fld>
             <a:endParaRPr lang="de-DE"/>
           </a:p>
@@ -1815,7 +1816,7 @@
           <a:p>
             <a:fld id="{72F08137-116F-452A-B67D-5625C039EDA3}" type="datetimeFigureOut">
               <a:rPr lang="de-DE" smtClean="0"/>
-              <a:t>05.05.2025</a:t>
+              <a:t>05.07.2025</a:t>
             </a:fld>
             <a:endParaRPr lang="de-DE"/>
           </a:p>
@@ -1956,7 +1957,7 @@
           <a:p>
             <a:fld id="{72F08137-116F-452A-B67D-5625C039EDA3}" type="datetimeFigureOut">
               <a:rPr lang="de-DE" smtClean="0"/>
-              <a:t>05.05.2025</a:t>
+              <a:t>05.07.2025</a:t>
             </a:fld>
             <a:endParaRPr lang="de-DE"/>
           </a:p>
@@ -2069,7 +2070,7 @@
           <a:p>
             <a:fld id="{72F08137-116F-452A-B67D-5625C039EDA3}" type="datetimeFigureOut">
               <a:rPr lang="de-DE" smtClean="0"/>
-              <a:t>05.05.2025</a:t>
+              <a:t>05.07.2025</a:t>
             </a:fld>
             <a:endParaRPr lang="de-DE"/>
           </a:p>
@@ -2380,7 +2381,7 @@
           <a:p>
             <a:fld id="{72F08137-116F-452A-B67D-5625C039EDA3}" type="datetimeFigureOut">
               <a:rPr lang="de-DE" smtClean="0"/>
-              <a:t>05.05.2025</a:t>
+              <a:t>05.07.2025</a:t>
             </a:fld>
             <a:endParaRPr lang="de-DE"/>
           </a:p>
@@ -2668,7 +2669,7 @@
           <a:p>
             <a:fld id="{72F08137-116F-452A-B67D-5625C039EDA3}" type="datetimeFigureOut">
               <a:rPr lang="de-DE" smtClean="0"/>
-              <a:t>05.05.2025</a:t>
+              <a:t>05.07.2025</a:t>
             </a:fld>
             <a:endParaRPr lang="de-DE"/>
           </a:p>
@@ -2909,7 +2910,7 @@
           <a:p>
             <a:fld id="{72F08137-116F-452A-B67D-5625C039EDA3}" type="datetimeFigureOut">
               <a:rPr lang="de-DE" smtClean="0"/>
-              <a:t>05.05.2025</a:t>
+              <a:t>05.07.2025</a:t>
             </a:fld>
             <a:endParaRPr lang="de-DE"/>
           </a:p>
@@ -6903,6 +6904,4030 @@
 </p:sld>
 </file>
 
+<file path=ppt/slides/slide2.xml><?xml version="1.0" encoding="utf-8"?>
+<p:sld xmlns:a="http://schemas.openxmlformats.org/drawingml/2006/main" xmlns:r="http://schemas.openxmlformats.org/officeDocument/2006/relationships" xmlns:p="http://schemas.openxmlformats.org/presentationml/2006/main">
+  <p:cSld>
+    <p:spTree>
+      <p:nvGrpSpPr>
+        <p:cNvPr id="1" name=""/>
+        <p:cNvGrpSpPr/>
+        <p:nvPr/>
+      </p:nvGrpSpPr>
+      <p:grpSpPr>
+        <a:xfrm>
+          <a:off x="0" y="0"/>
+          <a:ext cx="0" cy="0"/>
+          <a:chOff x="0" y="0"/>
+          <a:chExt cx="0" cy="0"/>
+        </a:xfrm>
+      </p:grpSpPr>
+      <p:sp>
+        <p:nvSpPr>
+          <p:cNvPr id="4" name="Rechteck 3">
+            <a:extLst>
+              <a:ext uri="{FF2B5EF4-FFF2-40B4-BE49-F238E27FC236}">
+                <a16:creationId xmlns:a16="http://schemas.microsoft.com/office/drawing/2014/main" id="{ABDE19AC-1061-4316-6614-820FE6A93139}"/>
+              </a:ext>
+            </a:extLst>
+          </p:cNvPr>
+          <p:cNvSpPr/>
+          <p:nvPr/>
+        </p:nvSpPr>
+        <p:spPr>
+          <a:xfrm>
+            <a:off x="1406246" y="2048399"/>
+            <a:ext cx="3157870" cy="3157870"/>
+          </a:xfrm>
+          <a:prstGeom prst="rect">
+            <a:avLst/>
+          </a:prstGeom>
+          <a:noFill/>
+        </p:spPr>
+        <p:style>
+          <a:lnRef idx="2">
+            <a:schemeClr val="accent1">
+              <a:shade val="15000"/>
+            </a:schemeClr>
+          </a:lnRef>
+          <a:fillRef idx="1">
+            <a:schemeClr val="accent1"/>
+          </a:fillRef>
+          <a:effectRef idx="0">
+            <a:schemeClr val="accent1"/>
+          </a:effectRef>
+          <a:fontRef idx="minor">
+            <a:schemeClr val="lt1"/>
+          </a:fontRef>
+        </p:style>
+        <p:txBody>
+          <a:bodyPr rtlCol="0" anchor="ctr"/>
+          <a:lstStyle/>
+          <a:p>
+            <a:pPr algn="ctr"/>
+            <a:endParaRPr lang="de-DE"/>
+          </a:p>
+        </p:txBody>
+      </p:sp>
+      <p:graphicFrame>
+        <p:nvGraphicFramePr>
+          <p:cNvPr id="5" name="Tabelle 4">
+            <a:extLst>
+              <a:ext uri="{FF2B5EF4-FFF2-40B4-BE49-F238E27FC236}">
+                <a16:creationId xmlns:a16="http://schemas.microsoft.com/office/drawing/2014/main" id="{B03C9FDA-277E-D61D-A1B6-2EAD8BDAD8F9}"/>
+              </a:ext>
+            </a:extLst>
+          </p:cNvPr>
+          <p:cNvGraphicFramePr>
+            <a:graphicFrameLocks noGrp="1"/>
+          </p:cNvGraphicFramePr>
+          <p:nvPr/>
+        </p:nvGraphicFramePr>
+        <p:xfrm>
+          <a:off x="1406247" y="2048398"/>
+          <a:ext cx="3157870" cy="3157870"/>
+        </p:xfrm>
+        <a:graphic>
+          <a:graphicData uri="http://schemas.openxmlformats.org/drawingml/2006/table">
+            <a:tbl>
+              <a:tblPr>
+                <a:tableStyleId>{5C22544A-7EE6-4342-B048-85BDC9FD1C3A}</a:tableStyleId>
+              </a:tblPr>
+              <a:tblGrid>
+                <a:gridCol w="631574">
+                  <a:extLst>
+                    <a:ext uri="{9D8B030D-6E8A-4147-A177-3AD203B41FA5}">
+                      <a16:colId xmlns:a16="http://schemas.microsoft.com/office/drawing/2014/main" val="4243847136"/>
+                    </a:ext>
+                  </a:extLst>
+                </a:gridCol>
+                <a:gridCol w="631574">
+                  <a:extLst>
+                    <a:ext uri="{9D8B030D-6E8A-4147-A177-3AD203B41FA5}">
+                      <a16:colId xmlns:a16="http://schemas.microsoft.com/office/drawing/2014/main" val="730987479"/>
+                    </a:ext>
+                  </a:extLst>
+                </a:gridCol>
+                <a:gridCol w="631574">
+                  <a:extLst>
+                    <a:ext uri="{9D8B030D-6E8A-4147-A177-3AD203B41FA5}">
+                      <a16:colId xmlns:a16="http://schemas.microsoft.com/office/drawing/2014/main" val="2579064476"/>
+                    </a:ext>
+                  </a:extLst>
+                </a:gridCol>
+                <a:gridCol w="631574">
+                  <a:extLst>
+                    <a:ext uri="{9D8B030D-6E8A-4147-A177-3AD203B41FA5}">
+                      <a16:colId xmlns:a16="http://schemas.microsoft.com/office/drawing/2014/main" val="2418198056"/>
+                    </a:ext>
+                  </a:extLst>
+                </a:gridCol>
+                <a:gridCol w="631574">
+                  <a:extLst>
+                    <a:ext uri="{9D8B030D-6E8A-4147-A177-3AD203B41FA5}">
+                      <a16:colId xmlns:a16="http://schemas.microsoft.com/office/drawing/2014/main" val="2184666572"/>
+                    </a:ext>
+                  </a:extLst>
+                </a:gridCol>
+              </a:tblGrid>
+              <a:tr h="631574">
+                <a:tc>
+                  <a:txBody>
+                    <a:bodyPr/>
+                    <a:lstStyle/>
+                    <a:p>
+                      <a:endParaRPr lang="de-DE" sz="2400" dirty="0"/>
+                    </a:p>
+                  </a:txBody>
+                  <a:tcPr anchor="ctr" anchorCtr="1">
+                    <a:solidFill>
+                      <a:schemeClr val="bg1">
+                        <a:lumMod val="95000"/>
+                      </a:schemeClr>
+                    </a:solidFill>
+                  </a:tcPr>
+                </a:tc>
+                <a:tc>
+                  <a:txBody>
+                    <a:bodyPr/>
+                    <a:lstStyle/>
+                    <a:p>
+                      <a:r>
+                        <a:rPr lang="el-GR" sz="2400" dirty="0"/>
+                        <a:t>α</a:t>
+                      </a:r>
+                      <a:endParaRPr lang="de-DE" sz="2400" dirty="0"/>
+                    </a:p>
+                  </a:txBody>
+                  <a:tcPr anchor="ctr" anchorCtr="1">
+                    <a:solidFill>
+                      <a:schemeClr val="bg1">
+                        <a:lumMod val="95000"/>
+                      </a:schemeClr>
+                    </a:solidFill>
+                  </a:tcPr>
+                </a:tc>
+                <a:tc>
+                  <a:txBody>
+                    <a:bodyPr/>
+                    <a:lstStyle/>
+                    <a:p>
+                      <a:endParaRPr lang="de-DE" sz="2400" dirty="0"/>
+                    </a:p>
+                  </a:txBody>
+                  <a:tcPr anchor="ctr" anchorCtr="1">
+                    <a:solidFill>
+                      <a:schemeClr val="bg1">
+                        <a:lumMod val="95000"/>
+                      </a:schemeClr>
+                    </a:solidFill>
+                  </a:tcPr>
+                </a:tc>
+                <a:tc>
+                  <a:txBody>
+                    <a:bodyPr/>
+                    <a:lstStyle/>
+                    <a:p>
+                      <a:endParaRPr lang="de-DE" sz="2400"/>
+                    </a:p>
+                  </a:txBody>
+                  <a:tcPr anchor="ctr" anchorCtr="1">
+                    <a:solidFill>
+                      <a:schemeClr val="bg1">
+                        <a:lumMod val="95000"/>
+                      </a:schemeClr>
+                    </a:solidFill>
+                  </a:tcPr>
+                </a:tc>
+                <a:tc>
+                  <a:txBody>
+                    <a:bodyPr/>
+                    <a:lstStyle/>
+                    <a:p>
+                      <a:endParaRPr lang="de-DE" sz="2400" dirty="0"/>
+                    </a:p>
+                  </a:txBody>
+                  <a:tcPr anchor="ctr" anchorCtr="1">
+                    <a:solidFill>
+                      <a:schemeClr val="bg1">
+                        <a:lumMod val="95000"/>
+                      </a:schemeClr>
+                    </a:solidFill>
+                  </a:tcPr>
+                </a:tc>
+                <a:extLst>
+                  <a:ext uri="{0D108BD9-81ED-4DB2-BD59-A6C34878D82A}">
+                    <a16:rowId xmlns:a16="http://schemas.microsoft.com/office/drawing/2014/main" val="1360166703"/>
+                  </a:ext>
+                </a:extLst>
+              </a:tr>
+              <a:tr h="631574">
+                <a:tc>
+                  <a:txBody>
+                    <a:bodyPr/>
+                    <a:lstStyle/>
+                    <a:p>
+                      <a:endParaRPr lang="de-DE" sz="2400"/>
+                    </a:p>
+                  </a:txBody>
+                  <a:tcPr anchor="ctr" anchorCtr="1">
+                    <a:solidFill>
+                      <a:schemeClr val="bg1">
+                        <a:lumMod val="95000"/>
+                      </a:schemeClr>
+                    </a:solidFill>
+                  </a:tcPr>
+                </a:tc>
+                <a:tc>
+                  <a:txBody>
+                    <a:bodyPr/>
+                    <a:lstStyle/>
+                    <a:p>
+                      <a:endParaRPr lang="de-DE" sz="2400"/>
+                    </a:p>
+                  </a:txBody>
+                  <a:tcPr anchor="ctr" anchorCtr="1">
+                    <a:solidFill>
+                      <a:schemeClr val="bg1">
+                        <a:lumMod val="95000"/>
+                      </a:schemeClr>
+                    </a:solidFill>
+                  </a:tcPr>
+                </a:tc>
+                <a:tc>
+                  <a:txBody>
+                    <a:bodyPr/>
+                    <a:lstStyle/>
+                    <a:p>
+                      <a:pPr marL="0" marR="0" lvl="0" indent="0" algn="l" defTabSz="914400" rtl="0" eaLnBrk="1" fontAlgn="auto" latinLnBrk="0" hangingPunct="1">
+                        <a:lnSpc>
+                          <a:spcPct val="100000"/>
+                        </a:lnSpc>
+                        <a:spcBef>
+                          <a:spcPts val="0"/>
+                        </a:spcBef>
+                        <a:spcAft>
+                          <a:spcPts val="0"/>
+                        </a:spcAft>
+                        <a:buClrTx/>
+                        <a:buSzTx/>
+                        <a:buFontTx/>
+                        <a:buNone/>
+                        <a:tabLst/>
+                        <a:defRPr/>
+                      </a:pPr>
+                      <a:r>
+                        <a:rPr lang="el-GR" sz="2400" dirty="0"/>
+                        <a:t>β</a:t>
+                      </a:r>
+                      <a:endParaRPr lang="de-DE" sz="2400" dirty="0"/>
+                    </a:p>
+                  </a:txBody>
+                  <a:tcPr anchor="ctr" anchorCtr="1">
+                    <a:solidFill>
+                      <a:schemeClr val="bg1">
+                        <a:lumMod val="95000"/>
+                      </a:schemeClr>
+                    </a:solidFill>
+                  </a:tcPr>
+                </a:tc>
+                <a:tc>
+                  <a:txBody>
+                    <a:bodyPr/>
+                    <a:lstStyle/>
+                    <a:p>
+                      <a:endParaRPr lang="de-DE" sz="2400"/>
+                    </a:p>
+                  </a:txBody>
+                  <a:tcPr anchor="ctr" anchorCtr="1">
+                    <a:solidFill>
+                      <a:schemeClr val="bg1">
+                        <a:lumMod val="95000"/>
+                      </a:schemeClr>
+                    </a:solidFill>
+                  </a:tcPr>
+                </a:tc>
+                <a:tc>
+                  <a:txBody>
+                    <a:bodyPr/>
+                    <a:lstStyle/>
+                    <a:p>
+                      <a:endParaRPr lang="de-DE" sz="2400"/>
+                    </a:p>
+                  </a:txBody>
+                  <a:tcPr anchor="ctr" anchorCtr="1">
+                    <a:solidFill>
+                      <a:schemeClr val="bg1">
+                        <a:lumMod val="95000"/>
+                      </a:schemeClr>
+                    </a:solidFill>
+                  </a:tcPr>
+                </a:tc>
+                <a:extLst>
+                  <a:ext uri="{0D108BD9-81ED-4DB2-BD59-A6C34878D82A}">
+                    <a16:rowId xmlns:a16="http://schemas.microsoft.com/office/drawing/2014/main" val="1419786815"/>
+                  </a:ext>
+                </a:extLst>
+              </a:tr>
+              <a:tr h="631574">
+                <a:tc>
+                  <a:txBody>
+                    <a:bodyPr/>
+                    <a:lstStyle/>
+                    <a:p>
+                      <a:endParaRPr lang="de-DE" sz="2400"/>
+                    </a:p>
+                  </a:txBody>
+                  <a:tcPr anchor="ctr" anchorCtr="1">
+                    <a:solidFill>
+                      <a:schemeClr val="bg1">
+                        <a:lumMod val="95000"/>
+                      </a:schemeClr>
+                    </a:solidFill>
+                  </a:tcPr>
+                </a:tc>
+                <a:tc>
+                  <a:txBody>
+                    <a:bodyPr/>
+                    <a:lstStyle/>
+                    <a:p>
+                      <a:endParaRPr lang="de-DE" sz="2400"/>
+                    </a:p>
+                  </a:txBody>
+                  <a:tcPr anchor="ctr" anchorCtr="1">
+                    <a:solidFill>
+                      <a:schemeClr val="bg1">
+                        <a:lumMod val="95000"/>
+                      </a:schemeClr>
+                    </a:solidFill>
+                  </a:tcPr>
+                </a:tc>
+                <a:tc>
+                  <a:txBody>
+                    <a:bodyPr/>
+                    <a:lstStyle/>
+                    <a:p>
+                      <a:endParaRPr lang="de-DE" sz="2400"/>
+                    </a:p>
+                  </a:txBody>
+                  <a:tcPr anchor="ctr" anchorCtr="1">
+                    <a:solidFill>
+                      <a:schemeClr val="bg1">
+                        <a:lumMod val="95000"/>
+                      </a:schemeClr>
+                    </a:solidFill>
+                  </a:tcPr>
+                </a:tc>
+                <a:tc>
+                  <a:txBody>
+                    <a:bodyPr/>
+                    <a:lstStyle/>
+                    <a:p>
+                      <a:endParaRPr lang="de-DE" sz="2400" dirty="0"/>
+                    </a:p>
+                  </a:txBody>
+                  <a:tcPr anchor="ctr" anchorCtr="1">
+                    <a:solidFill>
+                      <a:schemeClr val="bg1">
+                        <a:lumMod val="95000"/>
+                      </a:schemeClr>
+                    </a:solidFill>
+                  </a:tcPr>
+                </a:tc>
+                <a:tc>
+                  <a:txBody>
+                    <a:bodyPr/>
+                    <a:lstStyle/>
+                    <a:p>
+                      <a:pPr marL="0" marR="0" lvl="0" indent="0" algn="l" defTabSz="914400" rtl="0" eaLnBrk="1" fontAlgn="auto" latinLnBrk="0" hangingPunct="1">
+                        <a:lnSpc>
+                          <a:spcPct val="100000"/>
+                        </a:lnSpc>
+                        <a:spcBef>
+                          <a:spcPts val="0"/>
+                        </a:spcBef>
+                        <a:spcAft>
+                          <a:spcPts val="0"/>
+                        </a:spcAft>
+                        <a:buClrTx/>
+                        <a:buSzTx/>
+                        <a:buFontTx/>
+                        <a:buNone/>
+                        <a:tabLst/>
+                        <a:defRPr/>
+                      </a:pPr>
+                      <a:r>
+                        <a:rPr lang="el-GR" sz="2400" dirty="0"/>
+                        <a:t>ε</a:t>
+                      </a:r>
+                      <a:endParaRPr lang="de-DE" sz="2400" dirty="0"/>
+                    </a:p>
+                  </a:txBody>
+                  <a:tcPr anchor="ctr" anchorCtr="1">
+                    <a:solidFill>
+                      <a:schemeClr val="bg1">
+                        <a:lumMod val="95000"/>
+                      </a:schemeClr>
+                    </a:solidFill>
+                  </a:tcPr>
+                </a:tc>
+                <a:extLst>
+                  <a:ext uri="{0D108BD9-81ED-4DB2-BD59-A6C34878D82A}">
+                    <a16:rowId xmlns:a16="http://schemas.microsoft.com/office/drawing/2014/main" val="3287129764"/>
+                  </a:ext>
+                </a:extLst>
+              </a:tr>
+              <a:tr h="631574">
+                <a:tc>
+                  <a:txBody>
+                    <a:bodyPr/>
+                    <a:lstStyle/>
+                    <a:p>
+                      <a:r>
+                        <a:rPr lang="el-GR" sz="2400" dirty="0"/>
+                        <a:t>γ</a:t>
+                      </a:r>
+                      <a:endParaRPr lang="de-DE" sz="2400" dirty="0"/>
+                    </a:p>
+                  </a:txBody>
+                  <a:tcPr anchor="ctr" anchorCtr="1">
+                    <a:solidFill>
+                      <a:schemeClr val="bg1">
+                        <a:lumMod val="95000"/>
+                      </a:schemeClr>
+                    </a:solidFill>
+                  </a:tcPr>
+                </a:tc>
+                <a:tc>
+                  <a:txBody>
+                    <a:bodyPr/>
+                    <a:lstStyle/>
+                    <a:p>
+                      <a:endParaRPr lang="de-DE" sz="2400"/>
+                    </a:p>
+                  </a:txBody>
+                  <a:tcPr anchor="ctr" anchorCtr="1">
+                    <a:solidFill>
+                      <a:schemeClr val="bg1">
+                        <a:lumMod val="95000"/>
+                      </a:schemeClr>
+                    </a:solidFill>
+                  </a:tcPr>
+                </a:tc>
+                <a:tc>
+                  <a:txBody>
+                    <a:bodyPr/>
+                    <a:lstStyle/>
+                    <a:p>
+                      <a:endParaRPr lang="de-DE" sz="2400"/>
+                    </a:p>
+                  </a:txBody>
+                  <a:tcPr anchor="ctr" anchorCtr="1">
+                    <a:solidFill>
+                      <a:schemeClr val="bg1">
+                        <a:lumMod val="95000"/>
+                      </a:schemeClr>
+                    </a:solidFill>
+                  </a:tcPr>
+                </a:tc>
+                <a:tc>
+                  <a:txBody>
+                    <a:bodyPr/>
+                    <a:lstStyle/>
+                    <a:p>
+                      <a:r>
+                        <a:rPr lang="el-GR" sz="2400" dirty="0"/>
+                        <a:t>τ</a:t>
+                      </a:r>
+                      <a:endParaRPr lang="de-DE" sz="2400" dirty="0"/>
+                    </a:p>
+                  </a:txBody>
+                  <a:tcPr anchor="ctr" anchorCtr="1">
+                    <a:solidFill>
+                      <a:schemeClr val="bg1">
+                        <a:lumMod val="95000"/>
+                      </a:schemeClr>
+                    </a:solidFill>
+                  </a:tcPr>
+                </a:tc>
+                <a:tc>
+                  <a:txBody>
+                    <a:bodyPr/>
+                    <a:lstStyle/>
+                    <a:p>
+                      <a:endParaRPr lang="de-DE" sz="2400" dirty="0"/>
+                    </a:p>
+                  </a:txBody>
+                  <a:tcPr anchor="ctr" anchorCtr="1">
+                    <a:solidFill>
+                      <a:schemeClr val="bg1">
+                        <a:lumMod val="95000"/>
+                      </a:schemeClr>
+                    </a:solidFill>
+                  </a:tcPr>
+                </a:tc>
+                <a:extLst>
+                  <a:ext uri="{0D108BD9-81ED-4DB2-BD59-A6C34878D82A}">
+                    <a16:rowId xmlns:a16="http://schemas.microsoft.com/office/drawing/2014/main" val="3538972164"/>
+                  </a:ext>
+                </a:extLst>
+              </a:tr>
+              <a:tr h="631574">
+                <a:tc>
+                  <a:txBody>
+                    <a:bodyPr/>
+                    <a:lstStyle/>
+                    <a:p>
+                      <a:endParaRPr lang="de-DE" sz="2400" dirty="0"/>
+                    </a:p>
+                  </a:txBody>
+                  <a:tcPr anchor="ctr" anchorCtr="1">
+                    <a:solidFill>
+                      <a:schemeClr val="bg1">
+                        <a:lumMod val="95000"/>
+                      </a:schemeClr>
+                    </a:solidFill>
+                  </a:tcPr>
+                </a:tc>
+                <a:tc>
+                  <a:txBody>
+                    <a:bodyPr/>
+                    <a:lstStyle/>
+                    <a:p>
+                      <a:endParaRPr lang="de-DE" sz="2400"/>
+                    </a:p>
+                  </a:txBody>
+                  <a:tcPr anchor="ctr" anchorCtr="1">
+                    <a:solidFill>
+                      <a:schemeClr val="bg1">
+                        <a:lumMod val="95000"/>
+                      </a:schemeClr>
+                    </a:solidFill>
+                  </a:tcPr>
+                </a:tc>
+                <a:tc>
+                  <a:txBody>
+                    <a:bodyPr/>
+                    <a:lstStyle/>
+                    <a:p>
+                      <a:endParaRPr lang="de-DE" sz="2400"/>
+                    </a:p>
+                  </a:txBody>
+                  <a:tcPr anchor="ctr" anchorCtr="1">
+                    <a:solidFill>
+                      <a:schemeClr val="bg1">
+                        <a:lumMod val="95000"/>
+                      </a:schemeClr>
+                    </a:solidFill>
+                  </a:tcPr>
+                </a:tc>
+                <a:tc>
+                  <a:txBody>
+                    <a:bodyPr/>
+                    <a:lstStyle/>
+                    <a:p>
+                      <a:pPr marL="0" marR="0" lvl="0" indent="0" algn="l" defTabSz="914400" rtl="0" eaLnBrk="1" fontAlgn="auto" latinLnBrk="0" hangingPunct="1">
+                        <a:lnSpc>
+                          <a:spcPct val="100000"/>
+                        </a:lnSpc>
+                        <a:spcBef>
+                          <a:spcPts val="0"/>
+                        </a:spcBef>
+                        <a:spcAft>
+                          <a:spcPts val="0"/>
+                        </a:spcAft>
+                        <a:buClrTx/>
+                        <a:buSzTx/>
+                        <a:buFontTx/>
+                        <a:buNone/>
+                        <a:tabLst/>
+                        <a:defRPr/>
+                      </a:pPr>
+                      <a:r>
+                        <a:rPr lang="el-GR" sz="2400" dirty="0"/>
+                        <a:t>δ</a:t>
+                      </a:r>
+                      <a:endParaRPr lang="de-DE" sz="2400" dirty="0"/>
+                    </a:p>
+                  </a:txBody>
+                  <a:tcPr anchor="ctr" anchorCtr="1">
+                    <a:solidFill>
+                      <a:schemeClr val="bg1">
+                        <a:lumMod val="95000"/>
+                      </a:schemeClr>
+                    </a:solidFill>
+                  </a:tcPr>
+                </a:tc>
+                <a:tc>
+                  <a:txBody>
+                    <a:bodyPr/>
+                    <a:lstStyle/>
+                    <a:p>
+                      <a:endParaRPr lang="de-DE" sz="2400" dirty="0"/>
+                    </a:p>
+                  </a:txBody>
+                  <a:tcPr anchor="ctr" anchorCtr="1">
+                    <a:solidFill>
+                      <a:schemeClr val="bg1">
+                        <a:lumMod val="95000"/>
+                      </a:schemeClr>
+                    </a:solidFill>
+                  </a:tcPr>
+                </a:tc>
+                <a:extLst>
+                  <a:ext uri="{0D108BD9-81ED-4DB2-BD59-A6C34878D82A}">
+                    <a16:rowId xmlns:a16="http://schemas.microsoft.com/office/drawing/2014/main" val="3602767225"/>
+                  </a:ext>
+                </a:extLst>
+              </a:tr>
+            </a:tbl>
+          </a:graphicData>
+        </a:graphic>
+      </p:graphicFrame>
+      <p:grpSp>
+        <p:nvGrpSpPr>
+          <p:cNvPr id="16" name="Gruppieren 15">
+            <a:extLst>
+              <a:ext uri="{FF2B5EF4-FFF2-40B4-BE49-F238E27FC236}">
+                <a16:creationId xmlns:a16="http://schemas.microsoft.com/office/drawing/2014/main" id="{20057AC7-0AC3-D271-ADE4-CFB6147C239D}"/>
+              </a:ext>
+            </a:extLst>
+          </p:cNvPr>
+          <p:cNvGrpSpPr/>
+          <p:nvPr/>
+        </p:nvGrpSpPr>
+        <p:grpSpPr>
+          <a:xfrm>
+            <a:off x="873929" y="1587849"/>
+            <a:ext cx="3690187" cy="3506373"/>
+            <a:chOff x="988139" y="996110"/>
+            <a:chExt cx="3690187" cy="3506373"/>
+          </a:xfrm>
+        </p:grpSpPr>
+        <p:sp>
+          <p:nvSpPr>
+            <p:cNvPr id="6" name="Textfeld 5">
+              <a:extLst>
+                <a:ext uri="{FF2B5EF4-FFF2-40B4-BE49-F238E27FC236}">
+                  <a16:creationId xmlns:a16="http://schemas.microsoft.com/office/drawing/2014/main" id="{70ED5341-9E72-382F-DAD1-4D71E6DBED25}"/>
+                </a:ext>
+              </a:extLst>
+            </p:cNvPr>
+            <p:cNvSpPr txBox="1"/>
+            <p:nvPr/>
+          </p:nvSpPr>
+          <p:spPr>
+            <a:xfrm>
+              <a:off x="1520456" y="999460"/>
+              <a:ext cx="627321" cy="461665"/>
+            </a:xfrm>
+            <a:prstGeom prst="rect">
+              <a:avLst/>
+            </a:prstGeom>
+            <a:noFill/>
+          </p:spPr>
+          <p:txBody>
+            <a:bodyPr wrap="square" rtlCol="0">
+              <a:spAutoFit/>
+            </a:bodyPr>
+            <a:lstStyle/>
+            <a:p>
+              <a:pPr algn="ctr"/>
+              <a:r>
+                <a:rPr lang="de-DE" sz="2400" dirty="0"/>
+                <a:t>T0</a:t>
+              </a:r>
+              <a:endParaRPr lang="de-DE" sz="2400" baseline="-25000" dirty="0"/>
+            </a:p>
+          </p:txBody>
+        </p:sp>
+        <p:sp>
+          <p:nvSpPr>
+            <p:cNvPr id="7" name="Textfeld 6">
+              <a:extLst>
+                <a:ext uri="{FF2B5EF4-FFF2-40B4-BE49-F238E27FC236}">
+                  <a16:creationId xmlns:a16="http://schemas.microsoft.com/office/drawing/2014/main" id="{22DD5138-B122-AADE-8568-17AE335E42B3}"/>
+                </a:ext>
+              </a:extLst>
+            </p:cNvPr>
+            <p:cNvSpPr txBox="1"/>
+            <p:nvPr/>
+          </p:nvSpPr>
+          <p:spPr>
+            <a:xfrm>
+              <a:off x="2147777" y="997227"/>
+              <a:ext cx="627321" cy="461665"/>
+            </a:xfrm>
+            <a:prstGeom prst="rect">
+              <a:avLst/>
+            </a:prstGeom>
+            <a:noFill/>
+          </p:spPr>
+          <p:txBody>
+            <a:bodyPr wrap="square" rtlCol="0">
+              <a:spAutoFit/>
+            </a:bodyPr>
+            <a:lstStyle/>
+            <a:p>
+              <a:pPr algn="ctr"/>
+              <a:r>
+                <a:rPr lang="de-DE" sz="2400" dirty="0"/>
+                <a:t>T1</a:t>
+              </a:r>
+              <a:endParaRPr lang="de-DE" sz="2400" baseline="-25000" dirty="0"/>
+            </a:p>
+          </p:txBody>
+        </p:sp>
+        <p:sp>
+          <p:nvSpPr>
+            <p:cNvPr id="8" name="Textfeld 7">
+              <a:extLst>
+                <a:ext uri="{FF2B5EF4-FFF2-40B4-BE49-F238E27FC236}">
+                  <a16:creationId xmlns:a16="http://schemas.microsoft.com/office/drawing/2014/main" id="{A0EDEB13-24CF-D27E-7FC5-4B530B9CCB11}"/>
+                </a:ext>
+              </a:extLst>
+            </p:cNvPr>
+            <p:cNvSpPr txBox="1"/>
+            <p:nvPr/>
+          </p:nvSpPr>
+          <p:spPr>
+            <a:xfrm>
+              <a:off x="2776256" y="998343"/>
+              <a:ext cx="627321" cy="461665"/>
+            </a:xfrm>
+            <a:prstGeom prst="rect">
+              <a:avLst/>
+            </a:prstGeom>
+            <a:noFill/>
+          </p:spPr>
+          <p:txBody>
+            <a:bodyPr wrap="square" rtlCol="0">
+              <a:spAutoFit/>
+            </a:bodyPr>
+            <a:lstStyle/>
+            <a:p>
+              <a:pPr algn="ctr"/>
+              <a:r>
+                <a:rPr lang="de-DE" sz="2400" dirty="0"/>
+                <a:t>T2</a:t>
+              </a:r>
+              <a:endParaRPr lang="de-DE" sz="2400" baseline="-25000" dirty="0"/>
+            </a:p>
+          </p:txBody>
+        </p:sp>
+        <p:sp>
+          <p:nvSpPr>
+            <p:cNvPr id="9" name="Textfeld 8">
+              <a:extLst>
+                <a:ext uri="{FF2B5EF4-FFF2-40B4-BE49-F238E27FC236}">
+                  <a16:creationId xmlns:a16="http://schemas.microsoft.com/office/drawing/2014/main" id="{855E1E36-0ABE-7656-493B-73CDE32D60B5}"/>
+                </a:ext>
+              </a:extLst>
+            </p:cNvPr>
+            <p:cNvSpPr txBox="1"/>
+            <p:nvPr/>
+          </p:nvSpPr>
+          <p:spPr>
+            <a:xfrm>
+              <a:off x="3403577" y="996110"/>
+              <a:ext cx="627321" cy="461665"/>
+            </a:xfrm>
+            <a:prstGeom prst="rect">
+              <a:avLst/>
+            </a:prstGeom>
+            <a:noFill/>
+          </p:spPr>
+          <p:txBody>
+            <a:bodyPr wrap="square" rtlCol="0">
+              <a:spAutoFit/>
+            </a:bodyPr>
+            <a:lstStyle/>
+            <a:p>
+              <a:pPr algn="ctr"/>
+              <a:r>
+                <a:rPr lang="de-DE" sz="2400" dirty="0"/>
+                <a:t>A</a:t>
+              </a:r>
+              <a:endParaRPr lang="de-DE" sz="2400" baseline="-25000" dirty="0"/>
+            </a:p>
+          </p:txBody>
+        </p:sp>
+        <p:sp>
+          <p:nvSpPr>
+            <p:cNvPr id="10" name="Textfeld 9">
+              <a:extLst>
+                <a:ext uri="{FF2B5EF4-FFF2-40B4-BE49-F238E27FC236}">
+                  <a16:creationId xmlns:a16="http://schemas.microsoft.com/office/drawing/2014/main" id="{BFCE0593-9B27-F0A1-2A28-49EBA77643EB}"/>
+                </a:ext>
+              </a:extLst>
+            </p:cNvPr>
+            <p:cNvSpPr txBox="1"/>
+            <p:nvPr/>
+          </p:nvSpPr>
+          <p:spPr>
+            <a:xfrm>
+              <a:off x="4051005" y="996110"/>
+              <a:ext cx="627321" cy="461665"/>
+            </a:xfrm>
+            <a:prstGeom prst="rect">
+              <a:avLst/>
+            </a:prstGeom>
+            <a:noFill/>
+          </p:spPr>
+          <p:txBody>
+            <a:bodyPr wrap="square" rtlCol="0">
+              <a:spAutoFit/>
+            </a:bodyPr>
+            <a:lstStyle/>
+            <a:p>
+              <a:pPr algn="ctr"/>
+              <a:r>
+                <a:rPr lang="de-DE" sz="2400" dirty="0"/>
+                <a:t>B</a:t>
+              </a:r>
+              <a:endParaRPr lang="de-DE" sz="2400" baseline="-25000" dirty="0"/>
+            </a:p>
+          </p:txBody>
+        </p:sp>
+        <p:sp>
+          <p:nvSpPr>
+            <p:cNvPr id="11" name="Textfeld 10">
+              <a:extLst>
+                <a:ext uri="{FF2B5EF4-FFF2-40B4-BE49-F238E27FC236}">
+                  <a16:creationId xmlns:a16="http://schemas.microsoft.com/office/drawing/2014/main" id="{E20BA2EC-A734-1761-364F-48D97B459978}"/>
+                </a:ext>
+              </a:extLst>
+            </p:cNvPr>
+            <p:cNvSpPr txBox="1"/>
+            <p:nvPr/>
+          </p:nvSpPr>
+          <p:spPr>
+            <a:xfrm>
+              <a:off x="988140" y="1546222"/>
+              <a:ext cx="627321" cy="461665"/>
+            </a:xfrm>
+            <a:prstGeom prst="rect">
+              <a:avLst/>
+            </a:prstGeom>
+            <a:noFill/>
+          </p:spPr>
+          <p:txBody>
+            <a:bodyPr wrap="square" rtlCol="0">
+              <a:spAutoFit/>
+            </a:bodyPr>
+            <a:lstStyle/>
+            <a:p>
+              <a:pPr algn="ctr"/>
+              <a:r>
+                <a:rPr lang="de-DE" sz="2400" dirty="0"/>
+                <a:t>T0</a:t>
+              </a:r>
+              <a:endParaRPr lang="de-DE" sz="2400" baseline="-25000" dirty="0"/>
+            </a:p>
+          </p:txBody>
+        </p:sp>
+        <p:sp>
+          <p:nvSpPr>
+            <p:cNvPr id="12" name="Textfeld 11">
+              <a:extLst>
+                <a:ext uri="{FF2B5EF4-FFF2-40B4-BE49-F238E27FC236}">
+                  <a16:creationId xmlns:a16="http://schemas.microsoft.com/office/drawing/2014/main" id="{46F92594-95FA-A834-5554-326BDB45886F}"/>
+                </a:ext>
+              </a:extLst>
+            </p:cNvPr>
+            <p:cNvSpPr txBox="1"/>
+            <p:nvPr/>
+          </p:nvSpPr>
+          <p:spPr>
+            <a:xfrm>
+              <a:off x="988140" y="2142032"/>
+              <a:ext cx="627321" cy="461665"/>
+            </a:xfrm>
+            <a:prstGeom prst="rect">
+              <a:avLst/>
+            </a:prstGeom>
+            <a:noFill/>
+          </p:spPr>
+          <p:txBody>
+            <a:bodyPr wrap="square" rtlCol="0">
+              <a:spAutoFit/>
+            </a:bodyPr>
+            <a:lstStyle/>
+            <a:p>
+              <a:pPr algn="ctr"/>
+              <a:r>
+                <a:rPr lang="de-DE" sz="2400" dirty="0"/>
+                <a:t>T1</a:t>
+              </a:r>
+              <a:endParaRPr lang="de-DE" sz="2400" baseline="-25000" dirty="0"/>
+            </a:p>
+          </p:txBody>
+        </p:sp>
+        <p:sp>
+          <p:nvSpPr>
+            <p:cNvPr id="13" name="Textfeld 12">
+              <a:extLst>
+                <a:ext uri="{FF2B5EF4-FFF2-40B4-BE49-F238E27FC236}">
+                  <a16:creationId xmlns:a16="http://schemas.microsoft.com/office/drawing/2014/main" id="{3B01E33A-DEDD-B9C3-216C-7E5A17C784FA}"/>
+                </a:ext>
+              </a:extLst>
+            </p:cNvPr>
+            <p:cNvSpPr txBox="1"/>
+            <p:nvPr/>
+          </p:nvSpPr>
+          <p:spPr>
+            <a:xfrm>
+              <a:off x="988140" y="2781354"/>
+              <a:ext cx="627321" cy="461665"/>
+            </a:xfrm>
+            <a:prstGeom prst="rect">
+              <a:avLst/>
+            </a:prstGeom>
+            <a:noFill/>
+          </p:spPr>
+          <p:txBody>
+            <a:bodyPr wrap="square" rtlCol="0">
+              <a:spAutoFit/>
+            </a:bodyPr>
+            <a:lstStyle/>
+            <a:p>
+              <a:pPr algn="ctr"/>
+              <a:r>
+                <a:rPr lang="de-DE" sz="2400" dirty="0"/>
+                <a:t>T2</a:t>
+              </a:r>
+              <a:endParaRPr lang="de-DE" sz="2400" baseline="-25000" dirty="0"/>
+            </a:p>
+          </p:txBody>
+        </p:sp>
+        <p:sp>
+          <p:nvSpPr>
+            <p:cNvPr id="14" name="Textfeld 13">
+              <a:extLst>
+                <a:ext uri="{FF2B5EF4-FFF2-40B4-BE49-F238E27FC236}">
+                  <a16:creationId xmlns:a16="http://schemas.microsoft.com/office/drawing/2014/main" id="{8B63709F-73A5-A33B-4A6D-DC5CD5FB0719}"/>
+                </a:ext>
+              </a:extLst>
+            </p:cNvPr>
+            <p:cNvSpPr txBox="1"/>
+            <p:nvPr/>
+          </p:nvSpPr>
+          <p:spPr>
+            <a:xfrm>
+              <a:off x="988140" y="3467108"/>
+              <a:ext cx="627321" cy="461665"/>
+            </a:xfrm>
+            <a:prstGeom prst="rect">
+              <a:avLst/>
+            </a:prstGeom>
+            <a:noFill/>
+          </p:spPr>
+          <p:txBody>
+            <a:bodyPr wrap="square" rtlCol="0">
+              <a:spAutoFit/>
+            </a:bodyPr>
+            <a:lstStyle/>
+            <a:p>
+              <a:pPr algn="ctr"/>
+              <a:r>
+                <a:rPr lang="de-DE" sz="2400" dirty="0"/>
+                <a:t>A</a:t>
+              </a:r>
+              <a:endParaRPr lang="de-DE" sz="2400" baseline="-25000" dirty="0"/>
+            </a:p>
+          </p:txBody>
+        </p:sp>
+        <p:sp>
+          <p:nvSpPr>
+            <p:cNvPr id="15" name="Textfeld 14">
+              <a:extLst>
+                <a:ext uri="{FF2B5EF4-FFF2-40B4-BE49-F238E27FC236}">
+                  <a16:creationId xmlns:a16="http://schemas.microsoft.com/office/drawing/2014/main" id="{D94384A2-E308-0674-B8A0-349A83BF2357}"/>
+                </a:ext>
+              </a:extLst>
+            </p:cNvPr>
+            <p:cNvSpPr txBox="1"/>
+            <p:nvPr/>
+          </p:nvSpPr>
+          <p:spPr>
+            <a:xfrm>
+              <a:off x="988139" y="4040818"/>
+              <a:ext cx="627321" cy="461665"/>
+            </a:xfrm>
+            <a:prstGeom prst="rect">
+              <a:avLst/>
+            </a:prstGeom>
+            <a:noFill/>
+          </p:spPr>
+          <p:txBody>
+            <a:bodyPr wrap="square" rtlCol="0">
+              <a:spAutoFit/>
+            </a:bodyPr>
+            <a:lstStyle/>
+            <a:p>
+              <a:pPr algn="ctr"/>
+              <a:r>
+                <a:rPr lang="de-DE" sz="2400" dirty="0"/>
+                <a:t>B</a:t>
+              </a:r>
+              <a:endParaRPr lang="de-DE" sz="2400" baseline="-25000" dirty="0"/>
+            </a:p>
+          </p:txBody>
+        </p:sp>
+      </p:grpSp>
+      <p:graphicFrame>
+        <p:nvGraphicFramePr>
+          <p:cNvPr id="17" name="Tabelle 16">
+            <a:extLst>
+              <a:ext uri="{FF2B5EF4-FFF2-40B4-BE49-F238E27FC236}">
+                <a16:creationId xmlns:a16="http://schemas.microsoft.com/office/drawing/2014/main" id="{BC5816C8-4582-1C04-68A5-D5328E83A68D}"/>
+              </a:ext>
+            </a:extLst>
+          </p:cNvPr>
+          <p:cNvGraphicFramePr>
+            <a:graphicFrameLocks noGrp="1"/>
+          </p:cNvGraphicFramePr>
+          <p:nvPr>
+            <p:extLst>
+              <p:ext uri="{D42A27DB-BD31-4B8C-83A1-F6EECF244321}">
+                <p14:modId xmlns:p14="http://schemas.microsoft.com/office/powerpoint/2010/main" val="369374869"/>
+              </p:ext>
+            </p:extLst>
+          </p:nvPr>
+        </p:nvGraphicFramePr>
+        <p:xfrm>
+          <a:off x="6210557" y="1113678"/>
+          <a:ext cx="5055400" cy="5052592"/>
+        </p:xfrm>
+        <a:graphic>
+          <a:graphicData uri="http://schemas.openxmlformats.org/drawingml/2006/table">
+            <a:tbl>
+              <a:tblPr>
+                <a:tableStyleId>{5C22544A-7EE6-4342-B048-85BDC9FD1C3A}</a:tableStyleId>
+              </a:tblPr>
+              <a:tblGrid>
+                <a:gridCol w="631925">
+                  <a:extLst>
+                    <a:ext uri="{9D8B030D-6E8A-4147-A177-3AD203B41FA5}">
+                      <a16:colId xmlns:a16="http://schemas.microsoft.com/office/drawing/2014/main" val="4243847136"/>
+                    </a:ext>
+                  </a:extLst>
+                </a:gridCol>
+                <a:gridCol w="631925">
+                  <a:extLst>
+                    <a:ext uri="{9D8B030D-6E8A-4147-A177-3AD203B41FA5}">
+                      <a16:colId xmlns:a16="http://schemas.microsoft.com/office/drawing/2014/main" val="730987479"/>
+                    </a:ext>
+                  </a:extLst>
+                </a:gridCol>
+                <a:gridCol w="631925">
+                  <a:extLst>
+                    <a:ext uri="{9D8B030D-6E8A-4147-A177-3AD203B41FA5}">
+                      <a16:colId xmlns:a16="http://schemas.microsoft.com/office/drawing/2014/main" val="2579064476"/>
+                    </a:ext>
+                  </a:extLst>
+                </a:gridCol>
+                <a:gridCol w="631925">
+                  <a:extLst>
+                    <a:ext uri="{9D8B030D-6E8A-4147-A177-3AD203B41FA5}">
+                      <a16:colId xmlns:a16="http://schemas.microsoft.com/office/drawing/2014/main" val="2418198056"/>
+                    </a:ext>
+                  </a:extLst>
+                </a:gridCol>
+                <a:gridCol w="631925">
+                  <a:extLst>
+                    <a:ext uri="{9D8B030D-6E8A-4147-A177-3AD203B41FA5}">
+                      <a16:colId xmlns:a16="http://schemas.microsoft.com/office/drawing/2014/main" val="2184666572"/>
+                    </a:ext>
+                  </a:extLst>
+                </a:gridCol>
+                <a:gridCol w="631925">
+                  <a:extLst>
+                    <a:ext uri="{9D8B030D-6E8A-4147-A177-3AD203B41FA5}">
+                      <a16:colId xmlns:a16="http://schemas.microsoft.com/office/drawing/2014/main" val="3113923079"/>
+                    </a:ext>
+                  </a:extLst>
+                </a:gridCol>
+                <a:gridCol w="631925">
+                  <a:extLst>
+                    <a:ext uri="{9D8B030D-6E8A-4147-A177-3AD203B41FA5}">
+                      <a16:colId xmlns:a16="http://schemas.microsoft.com/office/drawing/2014/main" val="3947334126"/>
+                    </a:ext>
+                  </a:extLst>
+                </a:gridCol>
+                <a:gridCol w="631925">
+                  <a:extLst>
+                    <a:ext uri="{9D8B030D-6E8A-4147-A177-3AD203B41FA5}">
+                      <a16:colId xmlns:a16="http://schemas.microsoft.com/office/drawing/2014/main" val="990975154"/>
+                    </a:ext>
+                  </a:extLst>
+                </a:gridCol>
+              </a:tblGrid>
+              <a:tr h="631574">
+                <a:tc>
+                  <a:txBody>
+                    <a:bodyPr/>
+                    <a:lstStyle/>
+                    <a:p>
+                      <a:endParaRPr lang="de-DE" sz="2400" dirty="0"/>
+                    </a:p>
+                  </a:txBody>
+                  <a:tcPr anchor="ctr" anchorCtr="1">
+                    <a:solidFill>
+                      <a:schemeClr val="bg1">
+                        <a:lumMod val="95000"/>
+                      </a:schemeClr>
+                    </a:solidFill>
+                  </a:tcPr>
+                </a:tc>
+                <a:tc>
+                  <a:txBody>
+                    <a:bodyPr/>
+                    <a:lstStyle/>
+                    <a:p>
+                      <a:pPr marL="0" marR="0" lvl="0" indent="0" algn="l" defTabSz="914400" rtl="0" eaLnBrk="1" fontAlgn="auto" latinLnBrk="0" hangingPunct="1">
+                        <a:lnSpc>
+                          <a:spcPct val="100000"/>
+                        </a:lnSpc>
+                        <a:spcBef>
+                          <a:spcPts val="0"/>
+                        </a:spcBef>
+                        <a:spcAft>
+                          <a:spcPts val="0"/>
+                        </a:spcAft>
+                        <a:buClrTx/>
+                        <a:buSzTx/>
+                        <a:buFontTx/>
+                        <a:buNone/>
+                        <a:tabLst/>
+                        <a:defRPr/>
+                      </a:pPr>
+                      <a:r>
+                        <a:rPr kumimoji="0" lang="el-GR" sz="2400" b="0" i="0" u="none" strike="noStrike" kern="1200" cap="none" spc="0" normalizeH="0" baseline="0" noProof="0" dirty="0">
+                          <a:ln>
+                            <a:noFill/>
+                          </a:ln>
+                          <a:solidFill>
+                            <a:prstClr val="black"/>
+                          </a:solidFill>
+                          <a:effectLst/>
+                          <a:uLnTx/>
+                          <a:uFillTx/>
+                          <a:latin typeface="+mn-lt"/>
+                          <a:ea typeface="+mn-ea"/>
+                          <a:cs typeface="+mn-cs"/>
+                        </a:rPr>
+                        <a:t>α</a:t>
+                      </a:r>
+                      <a:endParaRPr kumimoji="0" lang="de-DE" sz="2400" b="0" i="0" u="none" strike="noStrike" kern="1200" cap="none" spc="0" normalizeH="0" baseline="0" noProof="0" dirty="0">
+                        <a:ln>
+                          <a:noFill/>
+                        </a:ln>
+                        <a:solidFill>
+                          <a:prstClr val="black"/>
+                        </a:solidFill>
+                        <a:effectLst/>
+                        <a:uLnTx/>
+                        <a:uFillTx/>
+                        <a:latin typeface="+mn-lt"/>
+                        <a:ea typeface="+mn-ea"/>
+                        <a:cs typeface="+mn-cs"/>
+                      </a:endParaRPr>
+                    </a:p>
+                  </a:txBody>
+                  <a:tcPr anchor="ctr" anchorCtr="1">
+                    <a:solidFill>
+                      <a:schemeClr val="bg1">
+                        <a:lumMod val="95000"/>
+                      </a:schemeClr>
+                    </a:solidFill>
+                  </a:tcPr>
+                </a:tc>
+                <a:tc>
+                  <a:txBody>
+                    <a:bodyPr/>
+                    <a:lstStyle/>
+                    <a:p>
+                      <a:endParaRPr lang="de-DE" sz="2400" dirty="0"/>
+                    </a:p>
+                  </a:txBody>
+                  <a:tcPr anchor="ctr" anchorCtr="1">
+                    <a:solidFill>
+                      <a:schemeClr val="bg1">
+                        <a:lumMod val="95000"/>
+                      </a:schemeClr>
+                    </a:solidFill>
+                  </a:tcPr>
+                </a:tc>
+                <a:tc>
+                  <a:txBody>
+                    <a:bodyPr/>
+                    <a:lstStyle/>
+                    <a:p>
+                      <a:endParaRPr lang="de-DE" sz="2400"/>
+                    </a:p>
+                  </a:txBody>
+                  <a:tcPr anchor="ctr" anchorCtr="1">
+                    <a:solidFill>
+                      <a:schemeClr val="bg1">
+                        <a:lumMod val="95000"/>
+                      </a:schemeClr>
+                    </a:solidFill>
+                  </a:tcPr>
+                </a:tc>
+                <a:tc>
+                  <a:txBody>
+                    <a:bodyPr/>
+                    <a:lstStyle/>
+                    <a:p>
+                      <a:endParaRPr lang="de-DE" sz="2400"/>
+                    </a:p>
+                  </a:txBody>
+                  <a:tcPr anchor="ctr" anchorCtr="1">
+                    <a:solidFill>
+                      <a:schemeClr val="bg1">
+                        <a:lumMod val="95000"/>
+                      </a:schemeClr>
+                    </a:solidFill>
+                  </a:tcPr>
+                </a:tc>
+                <a:tc>
+                  <a:txBody>
+                    <a:bodyPr/>
+                    <a:lstStyle/>
+                    <a:p>
+                      <a:endParaRPr lang="de-DE" sz="2400"/>
+                    </a:p>
+                  </a:txBody>
+                  <a:tcPr anchor="ctr" anchorCtr="1">
+                    <a:solidFill>
+                      <a:schemeClr val="bg1">
+                        <a:lumMod val="95000"/>
+                      </a:schemeClr>
+                    </a:solidFill>
+                  </a:tcPr>
+                </a:tc>
+                <a:tc>
+                  <a:txBody>
+                    <a:bodyPr/>
+                    <a:lstStyle/>
+                    <a:p>
+                      <a:endParaRPr lang="de-DE" sz="2400"/>
+                    </a:p>
+                  </a:txBody>
+                  <a:tcPr anchor="ctr" anchorCtr="1">
+                    <a:solidFill>
+                      <a:schemeClr val="bg1">
+                        <a:lumMod val="95000"/>
+                      </a:schemeClr>
+                    </a:solidFill>
+                  </a:tcPr>
+                </a:tc>
+                <a:tc>
+                  <a:txBody>
+                    <a:bodyPr/>
+                    <a:lstStyle/>
+                    <a:p>
+                      <a:endParaRPr lang="de-DE" sz="2400" dirty="0"/>
+                    </a:p>
+                  </a:txBody>
+                  <a:tcPr anchor="ctr" anchorCtr="1">
+                    <a:solidFill>
+                      <a:schemeClr val="bg1">
+                        <a:lumMod val="95000"/>
+                      </a:schemeClr>
+                    </a:solidFill>
+                  </a:tcPr>
+                </a:tc>
+                <a:extLst>
+                  <a:ext uri="{0D108BD9-81ED-4DB2-BD59-A6C34878D82A}">
+                    <a16:rowId xmlns:a16="http://schemas.microsoft.com/office/drawing/2014/main" val="1360166703"/>
+                  </a:ext>
+                </a:extLst>
+              </a:tr>
+              <a:tr h="631574">
+                <a:tc>
+                  <a:txBody>
+                    <a:bodyPr/>
+                    <a:lstStyle/>
+                    <a:p>
+                      <a:endParaRPr lang="de-DE" sz="2400"/>
+                    </a:p>
+                  </a:txBody>
+                  <a:tcPr anchor="ctr" anchorCtr="1">
+                    <a:solidFill>
+                      <a:schemeClr val="bg1">
+                        <a:lumMod val="95000"/>
+                      </a:schemeClr>
+                    </a:solidFill>
+                  </a:tcPr>
+                </a:tc>
+                <a:tc>
+                  <a:txBody>
+                    <a:bodyPr/>
+                    <a:lstStyle/>
+                    <a:p>
+                      <a:endParaRPr lang="de-DE" sz="2400"/>
+                    </a:p>
+                  </a:txBody>
+                  <a:tcPr anchor="ctr" anchorCtr="1">
+                    <a:solidFill>
+                      <a:schemeClr val="bg1">
+                        <a:lumMod val="95000"/>
+                      </a:schemeClr>
+                    </a:solidFill>
+                  </a:tcPr>
+                </a:tc>
+                <a:tc>
+                  <a:txBody>
+                    <a:bodyPr/>
+                    <a:lstStyle/>
+                    <a:p>
+                      <a:r>
+                        <a:rPr lang="el-GR" sz="2400" dirty="0"/>
+                        <a:t>β</a:t>
+                      </a:r>
+                      <a:endParaRPr lang="de-DE" sz="2400" dirty="0"/>
+                    </a:p>
+                  </a:txBody>
+                  <a:tcPr anchor="ctr" anchorCtr="1">
+                    <a:solidFill>
+                      <a:schemeClr val="bg1">
+                        <a:lumMod val="95000"/>
+                      </a:schemeClr>
+                    </a:solidFill>
+                  </a:tcPr>
+                </a:tc>
+                <a:tc>
+                  <a:txBody>
+                    <a:bodyPr/>
+                    <a:lstStyle/>
+                    <a:p>
+                      <a:endParaRPr lang="de-DE" sz="2400"/>
+                    </a:p>
+                  </a:txBody>
+                  <a:tcPr anchor="ctr" anchorCtr="1">
+                    <a:solidFill>
+                      <a:schemeClr val="bg1">
+                        <a:lumMod val="95000"/>
+                      </a:schemeClr>
+                    </a:solidFill>
+                  </a:tcPr>
+                </a:tc>
+                <a:tc>
+                  <a:txBody>
+                    <a:bodyPr/>
+                    <a:lstStyle/>
+                    <a:p>
+                      <a:endParaRPr lang="de-DE" sz="2400"/>
+                    </a:p>
+                  </a:txBody>
+                  <a:tcPr anchor="ctr" anchorCtr="1">
+                    <a:solidFill>
+                      <a:schemeClr val="bg1">
+                        <a:lumMod val="95000"/>
+                      </a:schemeClr>
+                    </a:solidFill>
+                  </a:tcPr>
+                </a:tc>
+                <a:tc>
+                  <a:txBody>
+                    <a:bodyPr/>
+                    <a:lstStyle/>
+                    <a:p>
+                      <a:endParaRPr lang="de-DE" sz="2400"/>
+                    </a:p>
+                  </a:txBody>
+                  <a:tcPr anchor="ctr" anchorCtr="1">
+                    <a:solidFill>
+                      <a:schemeClr val="bg1">
+                        <a:lumMod val="95000"/>
+                      </a:schemeClr>
+                    </a:solidFill>
+                  </a:tcPr>
+                </a:tc>
+                <a:tc>
+                  <a:txBody>
+                    <a:bodyPr/>
+                    <a:lstStyle/>
+                    <a:p>
+                      <a:endParaRPr lang="de-DE" sz="2400"/>
+                    </a:p>
+                  </a:txBody>
+                  <a:tcPr anchor="ctr" anchorCtr="1">
+                    <a:solidFill>
+                      <a:schemeClr val="bg1">
+                        <a:lumMod val="95000"/>
+                      </a:schemeClr>
+                    </a:solidFill>
+                  </a:tcPr>
+                </a:tc>
+                <a:tc>
+                  <a:txBody>
+                    <a:bodyPr/>
+                    <a:lstStyle/>
+                    <a:p>
+                      <a:endParaRPr lang="de-DE" sz="2400"/>
+                    </a:p>
+                  </a:txBody>
+                  <a:tcPr anchor="ctr" anchorCtr="1">
+                    <a:solidFill>
+                      <a:schemeClr val="bg1">
+                        <a:lumMod val="95000"/>
+                      </a:schemeClr>
+                    </a:solidFill>
+                  </a:tcPr>
+                </a:tc>
+                <a:extLst>
+                  <a:ext uri="{0D108BD9-81ED-4DB2-BD59-A6C34878D82A}">
+                    <a16:rowId xmlns:a16="http://schemas.microsoft.com/office/drawing/2014/main" val="1419786815"/>
+                  </a:ext>
+                </a:extLst>
+              </a:tr>
+              <a:tr h="631574">
+                <a:tc>
+                  <a:txBody>
+                    <a:bodyPr/>
+                    <a:lstStyle/>
+                    <a:p>
+                      <a:endParaRPr lang="de-DE" sz="2400"/>
+                    </a:p>
+                  </a:txBody>
+                  <a:tcPr anchor="ctr" anchorCtr="1">
+                    <a:solidFill>
+                      <a:schemeClr val="bg1">
+                        <a:lumMod val="95000"/>
+                      </a:schemeClr>
+                    </a:solidFill>
+                  </a:tcPr>
+                </a:tc>
+                <a:tc>
+                  <a:txBody>
+                    <a:bodyPr/>
+                    <a:lstStyle/>
+                    <a:p>
+                      <a:endParaRPr lang="de-DE" sz="2400"/>
+                    </a:p>
+                  </a:txBody>
+                  <a:tcPr anchor="ctr" anchorCtr="1">
+                    <a:solidFill>
+                      <a:schemeClr val="bg1">
+                        <a:lumMod val="95000"/>
+                      </a:schemeClr>
+                    </a:solidFill>
+                  </a:tcPr>
+                </a:tc>
+                <a:tc>
+                  <a:txBody>
+                    <a:bodyPr/>
+                    <a:lstStyle/>
+                    <a:p>
+                      <a:endParaRPr lang="de-DE" sz="2400"/>
+                    </a:p>
+                  </a:txBody>
+                  <a:tcPr anchor="ctr" anchorCtr="1">
+                    <a:solidFill>
+                      <a:schemeClr val="bg1">
+                        <a:lumMod val="95000"/>
+                      </a:schemeClr>
+                    </a:solidFill>
+                  </a:tcPr>
+                </a:tc>
+                <a:tc>
+                  <a:txBody>
+                    <a:bodyPr/>
+                    <a:lstStyle/>
+                    <a:p>
+                      <a:endParaRPr lang="de-DE" sz="2400" dirty="0"/>
+                    </a:p>
+                  </a:txBody>
+                  <a:tcPr anchor="ctr" anchorCtr="1">
+                    <a:solidFill>
+                      <a:schemeClr val="bg1">
+                        <a:lumMod val="95000"/>
+                      </a:schemeClr>
+                    </a:solidFill>
+                  </a:tcPr>
+                </a:tc>
+                <a:tc>
+                  <a:txBody>
+                    <a:bodyPr/>
+                    <a:lstStyle/>
+                    <a:p>
+                      <a:endParaRPr lang="de-DE" sz="2400"/>
+                    </a:p>
+                  </a:txBody>
+                  <a:tcPr anchor="ctr" anchorCtr="1">
+                    <a:solidFill>
+                      <a:schemeClr val="bg1">
+                        <a:lumMod val="95000"/>
+                      </a:schemeClr>
+                    </a:solidFill>
+                  </a:tcPr>
+                </a:tc>
+                <a:tc>
+                  <a:txBody>
+                    <a:bodyPr/>
+                    <a:lstStyle/>
+                    <a:p>
+                      <a:endParaRPr lang="de-DE" sz="2400"/>
+                    </a:p>
+                  </a:txBody>
+                  <a:tcPr anchor="ctr" anchorCtr="1">
+                    <a:solidFill>
+                      <a:schemeClr val="bg1">
+                        <a:lumMod val="95000"/>
+                      </a:schemeClr>
+                    </a:solidFill>
+                  </a:tcPr>
+                </a:tc>
+                <a:tc>
+                  <a:txBody>
+                    <a:bodyPr/>
+                    <a:lstStyle/>
+                    <a:p>
+                      <a:r>
+                        <a:rPr lang="el-GR" sz="2400" dirty="0"/>
+                        <a:t>ε</a:t>
+                      </a:r>
+                      <a:endParaRPr lang="de-DE" sz="2400" dirty="0"/>
+                    </a:p>
+                  </a:txBody>
+                  <a:tcPr anchor="ctr" anchorCtr="1">
+                    <a:solidFill>
+                      <a:schemeClr val="bg1">
+                        <a:lumMod val="95000"/>
+                      </a:schemeClr>
+                    </a:solidFill>
+                  </a:tcPr>
+                </a:tc>
+                <a:tc>
+                  <a:txBody>
+                    <a:bodyPr/>
+                    <a:lstStyle/>
+                    <a:p>
+                      <a:pPr marL="0" marR="0" lvl="0" indent="0" algn="l" defTabSz="914400" rtl="0" eaLnBrk="1" fontAlgn="auto" latinLnBrk="0" hangingPunct="1">
+                        <a:lnSpc>
+                          <a:spcPct val="100000"/>
+                        </a:lnSpc>
+                        <a:spcBef>
+                          <a:spcPts val="0"/>
+                        </a:spcBef>
+                        <a:spcAft>
+                          <a:spcPts val="0"/>
+                        </a:spcAft>
+                        <a:buClrTx/>
+                        <a:buSzTx/>
+                        <a:buFontTx/>
+                        <a:buNone/>
+                        <a:tabLst/>
+                        <a:defRPr/>
+                      </a:pPr>
+                      <a:r>
+                        <a:rPr lang="el-GR" sz="2400" dirty="0"/>
+                        <a:t>ε</a:t>
+                      </a:r>
+                      <a:endParaRPr lang="de-DE" sz="2400" dirty="0"/>
+                    </a:p>
+                  </a:txBody>
+                  <a:tcPr anchor="ctr" anchorCtr="1">
+                    <a:solidFill>
+                      <a:schemeClr val="bg1">
+                        <a:lumMod val="95000"/>
+                      </a:schemeClr>
+                    </a:solidFill>
+                  </a:tcPr>
+                </a:tc>
+                <a:extLst>
+                  <a:ext uri="{0D108BD9-81ED-4DB2-BD59-A6C34878D82A}">
+                    <a16:rowId xmlns:a16="http://schemas.microsoft.com/office/drawing/2014/main" val="3287129764"/>
+                  </a:ext>
+                </a:extLst>
+              </a:tr>
+              <a:tr h="631574">
+                <a:tc>
+                  <a:txBody>
+                    <a:bodyPr/>
+                    <a:lstStyle/>
+                    <a:p>
+                      <a:pPr marL="0" marR="0" lvl="0" indent="0" algn="l" defTabSz="914400" rtl="0" eaLnBrk="1" fontAlgn="auto" latinLnBrk="0" hangingPunct="1">
+                        <a:lnSpc>
+                          <a:spcPct val="100000"/>
+                        </a:lnSpc>
+                        <a:spcBef>
+                          <a:spcPts val="0"/>
+                        </a:spcBef>
+                        <a:spcAft>
+                          <a:spcPts val="0"/>
+                        </a:spcAft>
+                        <a:buClrTx/>
+                        <a:buSzTx/>
+                        <a:buFontTx/>
+                        <a:buNone/>
+                        <a:tabLst/>
+                        <a:defRPr/>
+                      </a:pPr>
+                      <a:r>
+                        <a:rPr lang="el-GR" sz="2400" dirty="0"/>
+                        <a:t>γ</a:t>
+                      </a:r>
+                      <a:endParaRPr lang="de-DE" sz="2400" dirty="0"/>
+                    </a:p>
+                  </a:txBody>
+                  <a:tcPr anchor="ctr" anchorCtr="1">
+                    <a:solidFill>
+                      <a:schemeClr val="bg1">
+                        <a:lumMod val="95000"/>
+                      </a:schemeClr>
+                    </a:solidFill>
+                  </a:tcPr>
+                </a:tc>
+                <a:tc>
+                  <a:txBody>
+                    <a:bodyPr/>
+                    <a:lstStyle/>
+                    <a:p>
+                      <a:endParaRPr lang="de-DE" sz="2400"/>
+                    </a:p>
+                  </a:txBody>
+                  <a:tcPr anchor="ctr" anchorCtr="1">
+                    <a:solidFill>
+                      <a:schemeClr val="bg1">
+                        <a:lumMod val="95000"/>
+                      </a:schemeClr>
+                    </a:solidFill>
+                  </a:tcPr>
+                </a:tc>
+                <a:tc>
+                  <a:txBody>
+                    <a:bodyPr/>
+                    <a:lstStyle/>
+                    <a:p>
+                      <a:endParaRPr lang="de-DE" sz="2400"/>
+                    </a:p>
+                  </a:txBody>
+                  <a:tcPr anchor="ctr" anchorCtr="1">
+                    <a:solidFill>
+                      <a:schemeClr val="bg1">
+                        <a:lumMod val="95000"/>
+                      </a:schemeClr>
+                    </a:solidFill>
+                  </a:tcPr>
+                </a:tc>
+                <a:tc>
+                  <a:txBody>
+                    <a:bodyPr/>
+                    <a:lstStyle/>
+                    <a:p>
+                      <a:pPr marL="0" marR="0" lvl="0" indent="0" algn="l" defTabSz="914400" rtl="0" eaLnBrk="1" fontAlgn="auto" latinLnBrk="0" hangingPunct="1">
+                        <a:lnSpc>
+                          <a:spcPct val="100000"/>
+                        </a:lnSpc>
+                        <a:spcBef>
+                          <a:spcPts val="0"/>
+                        </a:spcBef>
+                        <a:spcAft>
+                          <a:spcPts val="0"/>
+                        </a:spcAft>
+                        <a:buClrTx/>
+                        <a:buSzTx/>
+                        <a:buFontTx/>
+                        <a:buNone/>
+                        <a:tabLst/>
+                        <a:defRPr/>
+                      </a:pPr>
+                      <a:endParaRPr lang="de-DE" sz="2400" dirty="0"/>
+                    </a:p>
+                  </a:txBody>
+                  <a:tcPr anchor="ctr" anchorCtr="1">
+                    <a:solidFill>
+                      <a:schemeClr val="bg1">
+                        <a:lumMod val="95000"/>
+                      </a:schemeClr>
+                    </a:solidFill>
+                  </a:tcPr>
+                </a:tc>
+                <a:tc>
+                  <a:txBody>
+                    <a:bodyPr/>
+                    <a:lstStyle/>
+                    <a:p>
+                      <a:endParaRPr lang="de-DE" sz="2400" dirty="0"/>
+                    </a:p>
+                  </a:txBody>
+                  <a:tcPr anchor="ctr" anchorCtr="1">
+                    <a:solidFill>
+                      <a:schemeClr val="bg1">
+                        <a:lumMod val="95000"/>
+                      </a:schemeClr>
+                    </a:solidFill>
+                  </a:tcPr>
+                </a:tc>
+                <a:tc>
+                  <a:txBody>
+                    <a:bodyPr/>
+                    <a:lstStyle/>
+                    <a:p>
+                      <a:endParaRPr lang="de-DE" sz="2400" dirty="0"/>
+                    </a:p>
+                  </a:txBody>
+                  <a:tcPr anchor="ctr" anchorCtr="1">
+                    <a:solidFill>
+                      <a:schemeClr val="bg1">
+                        <a:lumMod val="95000"/>
+                      </a:schemeClr>
+                    </a:solidFill>
+                  </a:tcPr>
+                </a:tc>
+                <a:tc>
+                  <a:txBody>
+                    <a:bodyPr/>
+                    <a:lstStyle/>
+                    <a:p>
+                      <a:endParaRPr lang="de-DE" sz="2400" dirty="0"/>
+                    </a:p>
+                  </a:txBody>
+                  <a:tcPr anchor="ctr" anchorCtr="1">
+                    <a:solidFill>
+                      <a:schemeClr val="bg1">
+                        <a:lumMod val="95000"/>
+                      </a:schemeClr>
+                    </a:solidFill>
+                  </a:tcPr>
+                </a:tc>
+                <a:tc>
+                  <a:txBody>
+                    <a:bodyPr/>
+                    <a:lstStyle/>
+                    <a:p>
+                      <a:endParaRPr lang="de-DE" sz="2400" dirty="0"/>
+                    </a:p>
+                  </a:txBody>
+                  <a:tcPr anchor="ctr" anchorCtr="1">
+                    <a:solidFill>
+                      <a:schemeClr val="bg1">
+                        <a:lumMod val="95000"/>
+                      </a:schemeClr>
+                    </a:solidFill>
+                  </a:tcPr>
+                </a:tc>
+                <a:extLst>
+                  <a:ext uri="{0D108BD9-81ED-4DB2-BD59-A6C34878D82A}">
+                    <a16:rowId xmlns:a16="http://schemas.microsoft.com/office/drawing/2014/main" val="3538972164"/>
+                  </a:ext>
+                </a:extLst>
+              </a:tr>
+              <a:tr h="631574">
+                <a:tc>
+                  <a:txBody>
+                    <a:bodyPr/>
+                    <a:lstStyle/>
+                    <a:p>
+                      <a:pPr marL="0" marR="0" lvl="0" indent="0" algn="l" defTabSz="914400" rtl="0" eaLnBrk="1" fontAlgn="auto" latinLnBrk="0" hangingPunct="1">
+                        <a:lnSpc>
+                          <a:spcPct val="100000"/>
+                        </a:lnSpc>
+                        <a:spcBef>
+                          <a:spcPts val="0"/>
+                        </a:spcBef>
+                        <a:spcAft>
+                          <a:spcPts val="0"/>
+                        </a:spcAft>
+                        <a:buClrTx/>
+                        <a:buSzTx/>
+                        <a:buFontTx/>
+                        <a:buNone/>
+                        <a:tabLst/>
+                        <a:defRPr/>
+                      </a:pPr>
+                      <a:r>
+                        <a:rPr lang="el-GR" sz="2400" dirty="0"/>
+                        <a:t>γ</a:t>
+                      </a:r>
+                      <a:endParaRPr lang="de-DE" sz="2400" dirty="0"/>
+                    </a:p>
+                  </a:txBody>
+                  <a:tcPr anchor="ctr" anchorCtr="1">
+                    <a:solidFill>
+                      <a:schemeClr val="bg1">
+                        <a:lumMod val="95000"/>
+                      </a:schemeClr>
+                    </a:solidFill>
+                  </a:tcPr>
+                </a:tc>
+                <a:tc>
+                  <a:txBody>
+                    <a:bodyPr/>
+                    <a:lstStyle/>
+                    <a:p>
+                      <a:endParaRPr lang="de-DE" sz="2400"/>
+                    </a:p>
+                  </a:txBody>
+                  <a:tcPr anchor="ctr" anchorCtr="1">
+                    <a:solidFill>
+                      <a:schemeClr val="bg1">
+                        <a:lumMod val="95000"/>
+                      </a:schemeClr>
+                    </a:solidFill>
+                  </a:tcPr>
+                </a:tc>
+                <a:tc>
+                  <a:txBody>
+                    <a:bodyPr/>
+                    <a:lstStyle/>
+                    <a:p>
+                      <a:endParaRPr lang="de-DE" sz="2400"/>
+                    </a:p>
+                  </a:txBody>
+                  <a:tcPr anchor="ctr" anchorCtr="1">
+                    <a:solidFill>
+                      <a:schemeClr val="bg1">
+                        <a:lumMod val="95000"/>
+                      </a:schemeClr>
+                    </a:solidFill>
+                  </a:tcPr>
+                </a:tc>
+                <a:tc>
+                  <a:txBody>
+                    <a:bodyPr/>
+                    <a:lstStyle/>
+                    <a:p>
+                      <a:endParaRPr lang="de-DE" sz="2400" dirty="0"/>
+                    </a:p>
+                  </a:txBody>
+                  <a:tcPr anchor="ctr" anchorCtr="1">
+                    <a:solidFill>
+                      <a:schemeClr val="bg1">
+                        <a:lumMod val="95000"/>
+                      </a:schemeClr>
+                    </a:solidFill>
+                  </a:tcPr>
+                </a:tc>
+                <a:tc>
+                  <a:txBody>
+                    <a:bodyPr/>
+                    <a:lstStyle/>
+                    <a:p>
+                      <a:pPr marL="0" marR="0" lvl="0" indent="0" algn="l" defTabSz="914400" rtl="0" eaLnBrk="1" fontAlgn="auto" latinLnBrk="0" hangingPunct="1">
+                        <a:lnSpc>
+                          <a:spcPct val="100000"/>
+                        </a:lnSpc>
+                        <a:spcBef>
+                          <a:spcPts val="0"/>
+                        </a:spcBef>
+                        <a:spcAft>
+                          <a:spcPts val="0"/>
+                        </a:spcAft>
+                        <a:buClrTx/>
+                        <a:buSzTx/>
+                        <a:buFontTx/>
+                        <a:buNone/>
+                        <a:tabLst/>
+                        <a:defRPr/>
+                      </a:pPr>
+                      <a:endParaRPr lang="de-DE" sz="2400" dirty="0"/>
+                    </a:p>
+                  </a:txBody>
+                  <a:tcPr anchor="ctr" anchorCtr="1">
+                    <a:solidFill>
+                      <a:schemeClr val="bg1">
+                        <a:lumMod val="95000"/>
+                      </a:schemeClr>
+                    </a:solidFill>
+                  </a:tcPr>
+                </a:tc>
+                <a:tc>
+                  <a:txBody>
+                    <a:bodyPr/>
+                    <a:lstStyle/>
+                    <a:p>
+                      <a:endParaRPr lang="de-DE" sz="2400" dirty="0"/>
+                    </a:p>
+                  </a:txBody>
+                  <a:tcPr anchor="ctr" anchorCtr="1">
+                    <a:solidFill>
+                      <a:schemeClr val="bg1">
+                        <a:lumMod val="95000"/>
+                      </a:schemeClr>
+                    </a:solidFill>
+                  </a:tcPr>
+                </a:tc>
+                <a:tc>
+                  <a:txBody>
+                    <a:bodyPr/>
+                    <a:lstStyle/>
+                    <a:p>
+                      <a:endParaRPr lang="de-DE" sz="2400" dirty="0"/>
+                    </a:p>
+                  </a:txBody>
+                  <a:tcPr anchor="ctr" anchorCtr="1">
+                    <a:solidFill>
+                      <a:schemeClr val="bg1">
+                        <a:lumMod val="95000"/>
+                      </a:schemeClr>
+                    </a:solidFill>
+                  </a:tcPr>
+                </a:tc>
+                <a:tc>
+                  <a:txBody>
+                    <a:bodyPr/>
+                    <a:lstStyle/>
+                    <a:p>
+                      <a:endParaRPr lang="de-DE" sz="2400" dirty="0"/>
+                    </a:p>
+                  </a:txBody>
+                  <a:tcPr anchor="ctr" anchorCtr="1">
+                    <a:solidFill>
+                      <a:schemeClr val="bg1">
+                        <a:lumMod val="95000"/>
+                      </a:schemeClr>
+                    </a:solidFill>
+                  </a:tcPr>
+                </a:tc>
+                <a:extLst>
+                  <a:ext uri="{0D108BD9-81ED-4DB2-BD59-A6C34878D82A}">
+                    <a16:rowId xmlns:a16="http://schemas.microsoft.com/office/drawing/2014/main" val="1492369595"/>
+                  </a:ext>
+                </a:extLst>
+              </a:tr>
+              <a:tr h="631574">
+                <a:tc>
+                  <a:txBody>
+                    <a:bodyPr/>
+                    <a:lstStyle/>
+                    <a:p>
+                      <a:pPr marL="0" marR="0" lvl="0" indent="0" algn="l" defTabSz="914400" rtl="0" eaLnBrk="1" fontAlgn="auto" latinLnBrk="0" hangingPunct="1">
+                        <a:lnSpc>
+                          <a:spcPct val="100000"/>
+                        </a:lnSpc>
+                        <a:spcBef>
+                          <a:spcPts val="0"/>
+                        </a:spcBef>
+                        <a:spcAft>
+                          <a:spcPts val="0"/>
+                        </a:spcAft>
+                        <a:buClrTx/>
+                        <a:buSzTx/>
+                        <a:buFontTx/>
+                        <a:buNone/>
+                        <a:tabLst/>
+                        <a:defRPr/>
+                      </a:pPr>
+                      <a:r>
+                        <a:rPr lang="el-GR" sz="2400" dirty="0"/>
+                        <a:t>γ</a:t>
+                      </a:r>
+                      <a:endParaRPr lang="de-DE" sz="2400" dirty="0"/>
+                    </a:p>
+                  </a:txBody>
+                  <a:tcPr anchor="ctr" anchorCtr="1">
+                    <a:solidFill>
+                      <a:schemeClr val="bg1">
+                        <a:lumMod val="95000"/>
+                      </a:schemeClr>
+                    </a:solidFill>
+                  </a:tcPr>
+                </a:tc>
+                <a:tc>
+                  <a:txBody>
+                    <a:bodyPr/>
+                    <a:lstStyle/>
+                    <a:p>
+                      <a:endParaRPr lang="de-DE" sz="2400"/>
+                    </a:p>
+                  </a:txBody>
+                  <a:tcPr anchor="ctr" anchorCtr="1">
+                    <a:solidFill>
+                      <a:schemeClr val="bg1">
+                        <a:lumMod val="95000"/>
+                      </a:schemeClr>
+                    </a:solidFill>
+                  </a:tcPr>
+                </a:tc>
+                <a:tc>
+                  <a:txBody>
+                    <a:bodyPr/>
+                    <a:lstStyle/>
+                    <a:p>
+                      <a:endParaRPr lang="de-DE" sz="2400"/>
+                    </a:p>
+                  </a:txBody>
+                  <a:tcPr anchor="ctr" anchorCtr="1">
+                    <a:solidFill>
+                      <a:schemeClr val="bg1">
+                        <a:lumMod val="95000"/>
+                      </a:schemeClr>
+                    </a:solidFill>
+                  </a:tcPr>
+                </a:tc>
+                <a:tc>
+                  <a:txBody>
+                    <a:bodyPr/>
+                    <a:lstStyle/>
+                    <a:p>
+                      <a:endParaRPr lang="de-DE" sz="2400" dirty="0"/>
+                    </a:p>
+                  </a:txBody>
+                  <a:tcPr anchor="ctr" anchorCtr="1">
+                    <a:solidFill>
+                      <a:schemeClr val="bg1">
+                        <a:lumMod val="95000"/>
+                      </a:schemeClr>
+                    </a:solidFill>
+                  </a:tcPr>
+                </a:tc>
+                <a:tc>
+                  <a:txBody>
+                    <a:bodyPr/>
+                    <a:lstStyle/>
+                    <a:p>
+                      <a:endParaRPr lang="de-DE" sz="2400" dirty="0"/>
+                    </a:p>
+                  </a:txBody>
+                  <a:tcPr anchor="ctr" anchorCtr="1">
+                    <a:solidFill>
+                      <a:schemeClr val="bg1">
+                        <a:lumMod val="95000"/>
+                      </a:schemeClr>
+                    </a:solidFill>
+                  </a:tcPr>
+                </a:tc>
+                <a:tc>
+                  <a:txBody>
+                    <a:bodyPr/>
+                    <a:lstStyle/>
+                    <a:p>
+                      <a:pPr marL="0" marR="0" lvl="0" indent="0" algn="l" defTabSz="914400" rtl="0" eaLnBrk="1" fontAlgn="auto" latinLnBrk="0" hangingPunct="1">
+                        <a:lnSpc>
+                          <a:spcPct val="100000"/>
+                        </a:lnSpc>
+                        <a:spcBef>
+                          <a:spcPts val="0"/>
+                        </a:spcBef>
+                        <a:spcAft>
+                          <a:spcPts val="0"/>
+                        </a:spcAft>
+                        <a:buClrTx/>
+                        <a:buSzTx/>
+                        <a:buFontTx/>
+                        <a:buNone/>
+                        <a:tabLst/>
+                        <a:defRPr/>
+                      </a:pPr>
+                      <a:endParaRPr lang="de-DE" sz="2400" dirty="0"/>
+                    </a:p>
+                  </a:txBody>
+                  <a:tcPr anchor="ctr" anchorCtr="1">
+                    <a:solidFill>
+                      <a:schemeClr val="bg1">
+                        <a:lumMod val="95000"/>
+                      </a:schemeClr>
+                    </a:solidFill>
+                  </a:tcPr>
+                </a:tc>
+                <a:tc>
+                  <a:txBody>
+                    <a:bodyPr/>
+                    <a:lstStyle/>
+                    <a:p>
+                      <a:endParaRPr lang="de-DE" sz="2400" dirty="0"/>
+                    </a:p>
+                  </a:txBody>
+                  <a:tcPr anchor="ctr" anchorCtr="1">
+                    <a:solidFill>
+                      <a:schemeClr val="bg1">
+                        <a:lumMod val="95000"/>
+                      </a:schemeClr>
+                    </a:solidFill>
+                  </a:tcPr>
+                </a:tc>
+                <a:tc>
+                  <a:txBody>
+                    <a:bodyPr/>
+                    <a:lstStyle/>
+                    <a:p>
+                      <a:endParaRPr lang="de-DE" sz="2400" dirty="0"/>
+                    </a:p>
+                  </a:txBody>
+                  <a:tcPr anchor="ctr" anchorCtr="1">
+                    <a:solidFill>
+                      <a:schemeClr val="bg1">
+                        <a:lumMod val="95000"/>
+                      </a:schemeClr>
+                    </a:solidFill>
+                  </a:tcPr>
+                </a:tc>
+                <a:extLst>
+                  <a:ext uri="{0D108BD9-81ED-4DB2-BD59-A6C34878D82A}">
+                    <a16:rowId xmlns:a16="http://schemas.microsoft.com/office/drawing/2014/main" val="2539065582"/>
+                  </a:ext>
+                </a:extLst>
+              </a:tr>
+              <a:tr h="631574">
+                <a:tc>
+                  <a:txBody>
+                    <a:bodyPr/>
+                    <a:lstStyle/>
+                    <a:p>
+                      <a:endParaRPr lang="de-DE" sz="2400"/>
+                    </a:p>
+                  </a:txBody>
+                  <a:tcPr anchor="ctr" anchorCtr="1">
+                    <a:solidFill>
+                      <a:schemeClr val="bg1">
+                        <a:lumMod val="95000"/>
+                      </a:schemeClr>
+                    </a:solidFill>
+                  </a:tcPr>
+                </a:tc>
+                <a:tc>
+                  <a:txBody>
+                    <a:bodyPr/>
+                    <a:lstStyle/>
+                    <a:p>
+                      <a:endParaRPr lang="de-DE" sz="2400"/>
+                    </a:p>
+                  </a:txBody>
+                  <a:tcPr anchor="ctr" anchorCtr="1">
+                    <a:solidFill>
+                      <a:schemeClr val="bg1">
+                        <a:lumMod val="95000"/>
+                      </a:schemeClr>
+                    </a:solidFill>
+                  </a:tcPr>
+                </a:tc>
+                <a:tc>
+                  <a:txBody>
+                    <a:bodyPr/>
+                    <a:lstStyle/>
+                    <a:p>
+                      <a:endParaRPr lang="de-DE" sz="2400"/>
+                    </a:p>
+                  </a:txBody>
+                  <a:tcPr anchor="ctr" anchorCtr="1">
+                    <a:solidFill>
+                      <a:schemeClr val="bg1">
+                        <a:lumMod val="95000"/>
+                      </a:schemeClr>
+                    </a:solidFill>
+                  </a:tcPr>
+                </a:tc>
+                <a:tc>
+                  <a:txBody>
+                    <a:bodyPr/>
+                    <a:lstStyle/>
+                    <a:p>
+                      <a:pPr marL="0" marR="0" lvl="0" indent="0" algn="l" defTabSz="914400" rtl="0" eaLnBrk="1" fontAlgn="auto" latinLnBrk="0" hangingPunct="1">
+                        <a:lnSpc>
+                          <a:spcPct val="100000"/>
+                        </a:lnSpc>
+                        <a:spcBef>
+                          <a:spcPts val="0"/>
+                        </a:spcBef>
+                        <a:spcAft>
+                          <a:spcPts val="0"/>
+                        </a:spcAft>
+                        <a:buClrTx/>
+                        <a:buSzTx/>
+                        <a:buFontTx/>
+                        <a:buNone/>
+                        <a:tabLst/>
+                        <a:defRPr/>
+                      </a:pPr>
+                      <a:r>
+                        <a:rPr lang="el-GR" sz="2400" dirty="0"/>
+                        <a:t>δ</a:t>
+                      </a:r>
+                      <a:endParaRPr lang="de-DE" sz="2400" dirty="0"/>
+                    </a:p>
+                  </a:txBody>
+                  <a:tcPr anchor="ctr" anchorCtr="1">
+                    <a:solidFill>
+                      <a:schemeClr val="bg1">
+                        <a:lumMod val="95000"/>
+                      </a:schemeClr>
+                    </a:solidFill>
+                  </a:tcPr>
+                </a:tc>
+                <a:tc>
+                  <a:txBody>
+                    <a:bodyPr/>
+                    <a:lstStyle/>
+                    <a:p>
+                      <a:pPr marL="0" marR="0" lvl="0" indent="0" algn="l" defTabSz="914400" rtl="0" eaLnBrk="1" fontAlgn="auto" latinLnBrk="0" hangingPunct="1">
+                        <a:lnSpc>
+                          <a:spcPct val="100000"/>
+                        </a:lnSpc>
+                        <a:spcBef>
+                          <a:spcPts val="0"/>
+                        </a:spcBef>
+                        <a:spcAft>
+                          <a:spcPts val="0"/>
+                        </a:spcAft>
+                        <a:buClrTx/>
+                        <a:buSzTx/>
+                        <a:buFontTx/>
+                        <a:buNone/>
+                        <a:tabLst/>
+                        <a:defRPr/>
+                      </a:pPr>
+                      <a:r>
+                        <a:rPr lang="el-GR" sz="2400" dirty="0"/>
+                        <a:t>δ</a:t>
+                      </a:r>
+                      <a:endParaRPr lang="de-DE" sz="2400" dirty="0"/>
+                    </a:p>
+                  </a:txBody>
+                  <a:tcPr anchor="ctr" anchorCtr="1">
+                    <a:solidFill>
+                      <a:schemeClr val="bg1">
+                        <a:lumMod val="95000"/>
+                      </a:schemeClr>
+                    </a:solidFill>
+                  </a:tcPr>
+                </a:tc>
+                <a:tc>
+                  <a:txBody>
+                    <a:bodyPr/>
+                    <a:lstStyle/>
+                    <a:p>
+                      <a:pPr marL="0" marR="0" lvl="0" indent="0" algn="l" defTabSz="914400" rtl="0" eaLnBrk="1" fontAlgn="auto" latinLnBrk="0" hangingPunct="1">
+                        <a:lnSpc>
+                          <a:spcPct val="100000"/>
+                        </a:lnSpc>
+                        <a:spcBef>
+                          <a:spcPts val="0"/>
+                        </a:spcBef>
+                        <a:spcAft>
+                          <a:spcPts val="0"/>
+                        </a:spcAft>
+                        <a:buClrTx/>
+                        <a:buSzTx/>
+                        <a:buFontTx/>
+                        <a:buNone/>
+                        <a:tabLst/>
+                        <a:defRPr/>
+                      </a:pPr>
+                      <a:r>
+                        <a:rPr lang="el-GR" sz="2400" dirty="0"/>
+                        <a:t>δ</a:t>
+                      </a:r>
+                      <a:endParaRPr lang="de-DE" sz="2400" dirty="0"/>
+                    </a:p>
+                  </a:txBody>
+                  <a:tcPr anchor="ctr" anchorCtr="1">
+                    <a:solidFill>
+                      <a:schemeClr val="bg1">
+                        <a:lumMod val="95000"/>
+                      </a:schemeClr>
+                    </a:solidFill>
+                  </a:tcPr>
+                </a:tc>
+                <a:tc>
+                  <a:txBody>
+                    <a:bodyPr/>
+                    <a:lstStyle/>
+                    <a:p>
+                      <a:endParaRPr lang="de-DE" sz="2400" dirty="0"/>
+                    </a:p>
+                  </a:txBody>
+                  <a:tcPr anchor="ctr" anchorCtr="1">
+                    <a:solidFill>
+                      <a:schemeClr val="bg1">
+                        <a:lumMod val="95000"/>
+                      </a:schemeClr>
+                    </a:solidFill>
+                  </a:tcPr>
+                </a:tc>
+                <a:tc>
+                  <a:txBody>
+                    <a:bodyPr/>
+                    <a:lstStyle/>
+                    <a:p>
+                      <a:endParaRPr lang="de-DE" sz="2400" dirty="0"/>
+                    </a:p>
+                  </a:txBody>
+                  <a:tcPr anchor="ctr" anchorCtr="1">
+                    <a:solidFill>
+                      <a:schemeClr val="bg1">
+                        <a:lumMod val="95000"/>
+                      </a:schemeClr>
+                    </a:solidFill>
+                  </a:tcPr>
+                </a:tc>
+                <a:extLst>
+                  <a:ext uri="{0D108BD9-81ED-4DB2-BD59-A6C34878D82A}">
+                    <a16:rowId xmlns:a16="http://schemas.microsoft.com/office/drawing/2014/main" val="768376276"/>
+                  </a:ext>
+                </a:extLst>
+              </a:tr>
+              <a:tr h="631574">
+                <a:tc>
+                  <a:txBody>
+                    <a:bodyPr/>
+                    <a:lstStyle/>
+                    <a:p>
+                      <a:endParaRPr lang="de-DE" sz="2400"/>
+                    </a:p>
+                  </a:txBody>
+                  <a:tcPr anchor="ctr" anchorCtr="1">
+                    <a:solidFill>
+                      <a:schemeClr val="bg1">
+                        <a:lumMod val="95000"/>
+                      </a:schemeClr>
+                    </a:solidFill>
+                  </a:tcPr>
+                </a:tc>
+                <a:tc>
+                  <a:txBody>
+                    <a:bodyPr/>
+                    <a:lstStyle/>
+                    <a:p>
+                      <a:endParaRPr lang="de-DE" sz="2400"/>
+                    </a:p>
+                  </a:txBody>
+                  <a:tcPr anchor="ctr" anchorCtr="1">
+                    <a:solidFill>
+                      <a:schemeClr val="bg1">
+                        <a:lumMod val="95000"/>
+                      </a:schemeClr>
+                    </a:solidFill>
+                  </a:tcPr>
+                </a:tc>
+                <a:tc>
+                  <a:txBody>
+                    <a:bodyPr/>
+                    <a:lstStyle/>
+                    <a:p>
+                      <a:endParaRPr lang="de-DE" sz="2400"/>
+                    </a:p>
+                  </a:txBody>
+                  <a:tcPr anchor="ctr" anchorCtr="1">
+                    <a:solidFill>
+                      <a:schemeClr val="bg1">
+                        <a:lumMod val="95000"/>
+                      </a:schemeClr>
+                    </a:solidFill>
+                  </a:tcPr>
+                </a:tc>
+                <a:tc>
+                  <a:txBody>
+                    <a:bodyPr/>
+                    <a:lstStyle/>
+                    <a:p>
+                      <a:pPr marL="0" marR="0" lvl="0" indent="0" algn="l" defTabSz="914400" rtl="0" eaLnBrk="1" fontAlgn="auto" latinLnBrk="0" hangingPunct="1">
+                        <a:lnSpc>
+                          <a:spcPct val="100000"/>
+                        </a:lnSpc>
+                        <a:spcBef>
+                          <a:spcPts val="0"/>
+                        </a:spcBef>
+                        <a:spcAft>
+                          <a:spcPts val="0"/>
+                        </a:spcAft>
+                        <a:buClrTx/>
+                        <a:buSzTx/>
+                        <a:buFontTx/>
+                        <a:buNone/>
+                        <a:tabLst/>
+                        <a:defRPr/>
+                      </a:pPr>
+                      <a:r>
+                        <a:rPr lang="el-GR" sz="2400" dirty="0"/>
+                        <a:t>δ</a:t>
+                      </a:r>
+                      <a:endParaRPr lang="de-DE" sz="2400" dirty="0"/>
+                    </a:p>
+                  </a:txBody>
+                  <a:tcPr anchor="ctr" anchorCtr="1">
+                    <a:solidFill>
+                      <a:schemeClr val="bg1">
+                        <a:lumMod val="95000"/>
+                      </a:schemeClr>
+                    </a:solidFill>
+                  </a:tcPr>
+                </a:tc>
+                <a:tc>
+                  <a:txBody>
+                    <a:bodyPr/>
+                    <a:lstStyle/>
+                    <a:p>
+                      <a:pPr marL="0" marR="0" lvl="0" indent="0" algn="l" defTabSz="914400" rtl="0" eaLnBrk="1" fontAlgn="auto" latinLnBrk="0" hangingPunct="1">
+                        <a:lnSpc>
+                          <a:spcPct val="100000"/>
+                        </a:lnSpc>
+                        <a:spcBef>
+                          <a:spcPts val="0"/>
+                        </a:spcBef>
+                        <a:spcAft>
+                          <a:spcPts val="0"/>
+                        </a:spcAft>
+                        <a:buClrTx/>
+                        <a:buSzTx/>
+                        <a:buFontTx/>
+                        <a:buNone/>
+                        <a:tabLst/>
+                        <a:defRPr/>
+                      </a:pPr>
+                      <a:r>
+                        <a:rPr lang="el-GR" sz="2400" dirty="0"/>
+                        <a:t>δ</a:t>
+                      </a:r>
+                      <a:endParaRPr lang="de-DE" sz="2400" dirty="0"/>
+                    </a:p>
+                  </a:txBody>
+                  <a:tcPr anchor="ctr" anchorCtr="1">
+                    <a:solidFill>
+                      <a:schemeClr val="bg1">
+                        <a:lumMod val="95000"/>
+                      </a:schemeClr>
+                    </a:solidFill>
+                  </a:tcPr>
+                </a:tc>
+                <a:tc>
+                  <a:txBody>
+                    <a:bodyPr/>
+                    <a:lstStyle/>
+                    <a:p>
+                      <a:pPr marL="0" marR="0" lvl="0" indent="0" algn="l" defTabSz="914400" rtl="0" eaLnBrk="1" fontAlgn="auto" latinLnBrk="0" hangingPunct="1">
+                        <a:lnSpc>
+                          <a:spcPct val="100000"/>
+                        </a:lnSpc>
+                        <a:spcBef>
+                          <a:spcPts val="0"/>
+                        </a:spcBef>
+                        <a:spcAft>
+                          <a:spcPts val="0"/>
+                        </a:spcAft>
+                        <a:buClrTx/>
+                        <a:buSzTx/>
+                        <a:buFontTx/>
+                        <a:buNone/>
+                        <a:tabLst/>
+                        <a:defRPr/>
+                      </a:pPr>
+                      <a:r>
+                        <a:rPr lang="el-GR" sz="2400" dirty="0"/>
+                        <a:t>δ</a:t>
+                      </a:r>
+                      <a:endParaRPr lang="de-DE" sz="2400" dirty="0"/>
+                    </a:p>
+                  </a:txBody>
+                  <a:tcPr anchor="ctr" anchorCtr="1">
+                    <a:solidFill>
+                      <a:schemeClr val="bg1">
+                        <a:lumMod val="95000"/>
+                      </a:schemeClr>
+                    </a:solidFill>
+                  </a:tcPr>
+                </a:tc>
+                <a:tc>
+                  <a:txBody>
+                    <a:bodyPr/>
+                    <a:lstStyle/>
+                    <a:p>
+                      <a:endParaRPr lang="de-DE" sz="2400" dirty="0"/>
+                    </a:p>
+                  </a:txBody>
+                  <a:tcPr anchor="ctr" anchorCtr="1">
+                    <a:solidFill>
+                      <a:schemeClr val="bg1">
+                        <a:lumMod val="95000"/>
+                      </a:schemeClr>
+                    </a:solidFill>
+                  </a:tcPr>
+                </a:tc>
+                <a:tc>
+                  <a:txBody>
+                    <a:bodyPr/>
+                    <a:lstStyle/>
+                    <a:p>
+                      <a:endParaRPr lang="de-DE" sz="2400" dirty="0"/>
+                    </a:p>
+                  </a:txBody>
+                  <a:tcPr anchor="ctr" anchorCtr="1">
+                    <a:solidFill>
+                      <a:schemeClr val="bg1">
+                        <a:lumMod val="95000"/>
+                      </a:schemeClr>
+                    </a:solidFill>
+                  </a:tcPr>
+                </a:tc>
+                <a:extLst>
+                  <a:ext uri="{0D108BD9-81ED-4DB2-BD59-A6C34878D82A}">
+                    <a16:rowId xmlns:a16="http://schemas.microsoft.com/office/drawing/2014/main" val="3602767225"/>
+                  </a:ext>
+                </a:extLst>
+              </a:tr>
+            </a:tbl>
+          </a:graphicData>
+        </a:graphic>
+      </p:graphicFrame>
+      <p:sp>
+        <p:nvSpPr>
+          <p:cNvPr id="19" name="Textfeld 18">
+            <a:extLst>
+              <a:ext uri="{FF2B5EF4-FFF2-40B4-BE49-F238E27FC236}">
+                <a16:creationId xmlns:a16="http://schemas.microsoft.com/office/drawing/2014/main" id="{E388357B-5D3E-3E4A-FC32-86AB7FD4272A}"/>
+              </a:ext>
+            </a:extLst>
+          </p:cNvPr>
+          <p:cNvSpPr txBox="1"/>
+          <p:nvPr/>
+        </p:nvSpPr>
+        <p:spPr>
+          <a:xfrm>
+            <a:off x="6217319" y="656479"/>
+            <a:ext cx="627321" cy="461665"/>
+          </a:xfrm>
+          <a:prstGeom prst="rect">
+            <a:avLst/>
+          </a:prstGeom>
+          <a:noFill/>
+        </p:spPr>
+        <p:txBody>
+          <a:bodyPr wrap="square" rtlCol="0">
+            <a:spAutoFit/>
+          </a:bodyPr>
+          <a:lstStyle/>
+          <a:p>
+            <a:pPr algn="ctr"/>
+            <a:r>
+              <a:rPr lang="de-DE" sz="2400" dirty="0"/>
+              <a:t>T0</a:t>
+            </a:r>
+            <a:endParaRPr lang="de-DE" sz="2400" baseline="-25000" dirty="0"/>
+          </a:p>
+        </p:txBody>
+      </p:sp>
+      <p:sp>
+        <p:nvSpPr>
+          <p:cNvPr id="20" name="Textfeld 19">
+            <a:extLst>
+              <a:ext uri="{FF2B5EF4-FFF2-40B4-BE49-F238E27FC236}">
+                <a16:creationId xmlns:a16="http://schemas.microsoft.com/office/drawing/2014/main" id="{76348CD0-4E1A-06AB-A681-A8C85BA73981}"/>
+              </a:ext>
+            </a:extLst>
+          </p:cNvPr>
+          <p:cNvSpPr txBox="1"/>
+          <p:nvPr/>
+        </p:nvSpPr>
+        <p:spPr>
+          <a:xfrm>
+            <a:off x="6844640" y="654246"/>
+            <a:ext cx="627321" cy="461665"/>
+          </a:xfrm>
+          <a:prstGeom prst="rect">
+            <a:avLst/>
+          </a:prstGeom>
+          <a:noFill/>
+        </p:spPr>
+        <p:txBody>
+          <a:bodyPr wrap="square" rtlCol="0">
+            <a:spAutoFit/>
+          </a:bodyPr>
+          <a:lstStyle/>
+          <a:p>
+            <a:pPr algn="ctr"/>
+            <a:r>
+              <a:rPr lang="de-DE" sz="2400" dirty="0"/>
+              <a:t>T1</a:t>
+            </a:r>
+            <a:endParaRPr lang="de-DE" sz="2400" baseline="-25000" dirty="0"/>
+          </a:p>
+        </p:txBody>
+      </p:sp>
+      <p:sp>
+        <p:nvSpPr>
+          <p:cNvPr id="21" name="Textfeld 20">
+            <a:extLst>
+              <a:ext uri="{FF2B5EF4-FFF2-40B4-BE49-F238E27FC236}">
+                <a16:creationId xmlns:a16="http://schemas.microsoft.com/office/drawing/2014/main" id="{41BF8C70-0B86-C910-A8C2-8461593378FB}"/>
+              </a:ext>
+            </a:extLst>
+          </p:cNvPr>
+          <p:cNvSpPr txBox="1"/>
+          <p:nvPr/>
+        </p:nvSpPr>
+        <p:spPr>
+          <a:xfrm>
+            <a:off x="7473119" y="655362"/>
+            <a:ext cx="627321" cy="461665"/>
+          </a:xfrm>
+          <a:prstGeom prst="rect">
+            <a:avLst/>
+          </a:prstGeom>
+          <a:noFill/>
+        </p:spPr>
+        <p:txBody>
+          <a:bodyPr wrap="square" rtlCol="0">
+            <a:spAutoFit/>
+          </a:bodyPr>
+          <a:lstStyle/>
+          <a:p>
+            <a:pPr algn="ctr"/>
+            <a:r>
+              <a:rPr lang="de-DE" sz="2400" dirty="0"/>
+              <a:t>T2</a:t>
+            </a:r>
+            <a:endParaRPr lang="de-DE" sz="2400" baseline="-25000" dirty="0"/>
+          </a:p>
+        </p:txBody>
+      </p:sp>
+      <p:sp>
+        <p:nvSpPr>
+          <p:cNvPr id="23" name="Textfeld 22">
+            <a:extLst>
+              <a:ext uri="{FF2B5EF4-FFF2-40B4-BE49-F238E27FC236}">
+                <a16:creationId xmlns:a16="http://schemas.microsoft.com/office/drawing/2014/main" id="{2B1DFCE2-3FCC-0B0B-CBF3-C8CE9811A676}"/>
+              </a:ext>
+            </a:extLst>
+          </p:cNvPr>
+          <p:cNvSpPr txBox="1"/>
+          <p:nvPr/>
+        </p:nvSpPr>
+        <p:spPr>
+          <a:xfrm>
+            <a:off x="10000819" y="660051"/>
+            <a:ext cx="627321" cy="461665"/>
+          </a:xfrm>
+          <a:prstGeom prst="rect">
+            <a:avLst/>
+          </a:prstGeom>
+          <a:noFill/>
+        </p:spPr>
+        <p:txBody>
+          <a:bodyPr wrap="square" rtlCol="0">
+            <a:spAutoFit/>
+          </a:bodyPr>
+          <a:lstStyle/>
+          <a:p>
+            <a:pPr algn="ctr"/>
+            <a:r>
+              <a:rPr lang="de-DE" sz="2400" dirty="0"/>
+              <a:t>B</a:t>
+            </a:r>
+            <a:r>
+              <a:rPr lang="de-DE" sz="2400" baseline="-25000" dirty="0"/>
+              <a:t>0</a:t>
+            </a:r>
+          </a:p>
+        </p:txBody>
+      </p:sp>
+      <p:sp>
+        <p:nvSpPr>
+          <p:cNvPr id="24" name="Textfeld 23">
+            <a:extLst>
+              <a:ext uri="{FF2B5EF4-FFF2-40B4-BE49-F238E27FC236}">
+                <a16:creationId xmlns:a16="http://schemas.microsoft.com/office/drawing/2014/main" id="{0C8408C3-0C72-29D1-47A8-3A5DDFB58F5F}"/>
+              </a:ext>
+            </a:extLst>
+          </p:cNvPr>
+          <p:cNvSpPr txBox="1"/>
+          <p:nvPr/>
+        </p:nvSpPr>
+        <p:spPr>
+          <a:xfrm>
+            <a:off x="5685003" y="1203241"/>
+            <a:ext cx="627321" cy="461665"/>
+          </a:xfrm>
+          <a:prstGeom prst="rect">
+            <a:avLst/>
+          </a:prstGeom>
+          <a:noFill/>
+        </p:spPr>
+        <p:txBody>
+          <a:bodyPr wrap="square" rtlCol="0">
+            <a:spAutoFit/>
+          </a:bodyPr>
+          <a:lstStyle/>
+          <a:p>
+            <a:pPr algn="ctr"/>
+            <a:r>
+              <a:rPr lang="de-DE" sz="2400" dirty="0"/>
+              <a:t>T0</a:t>
+            </a:r>
+            <a:endParaRPr lang="de-DE" sz="2400" baseline="-25000" dirty="0"/>
+          </a:p>
+        </p:txBody>
+      </p:sp>
+      <p:sp>
+        <p:nvSpPr>
+          <p:cNvPr id="25" name="Textfeld 24">
+            <a:extLst>
+              <a:ext uri="{FF2B5EF4-FFF2-40B4-BE49-F238E27FC236}">
+                <a16:creationId xmlns:a16="http://schemas.microsoft.com/office/drawing/2014/main" id="{9AC39803-8168-D810-BE57-C8BCA339CE48}"/>
+              </a:ext>
+            </a:extLst>
+          </p:cNvPr>
+          <p:cNvSpPr txBox="1"/>
+          <p:nvPr/>
+        </p:nvSpPr>
+        <p:spPr>
+          <a:xfrm>
+            <a:off x="5685003" y="1799051"/>
+            <a:ext cx="627321" cy="461665"/>
+          </a:xfrm>
+          <a:prstGeom prst="rect">
+            <a:avLst/>
+          </a:prstGeom>
+          <a:noFill/>
+        </p:spPr>
+        <p:txBody>
+          <a:bodyPr wrap="square" rtlCol="0">
+            <a:spAutoFit/>
+          </a:bodyPr>
+          <a:lstStyle/>
+          <a:p>
+            <a:pPr algn="ctr"/>
+            <a:r>
+              <a:rPr lang="de-DE" sz="2400" dirty="0"/>
+              <a:t>T1</a:t>
+            </a:r>
+            <a:endParaRPr lang="de-DE" sz="2400" baseline="-25000" dirty="0"/>
+          </a:p>
+        </p:txBody>
+      </p:sp>
+      <p:sp>
+        <p:nvSpPr>
+          <p:cNvPr id="26" name="Textfeld 25">
+            <a:extLst>
+              <a:ext uri="{FF2B5EF4-FFF2-40B4-BE49-F238E27FC236}">
+                <a16:creationId xmlns:a16="http://schemas.microsoft.com/office/drawing/2014/main" id="{EEEC7962-C9D3-58B4-C209-02D6B4885F0C}"/>
+              </a:ext>
+            </a:extLst>
+          </p:cNvPr>
+          <p:cNvSpPr txBox="1"/>
+          <p:nvPr/>
+        </p:nvSpPr>
+        <p:spPr>
+          <a:xfrm>
+            <a:off x="5685003" y="2438373"/>
+            <a:ext cx="627321" cy="461665"/>
+          </a:xfrm>
+          <a:prstGeom prst="rect">
+            <a:avLst/>
+          </a:prstGeom>
+          <a:noFill/>
+        </p:spPr>
+        <p:txBody>
+          <a:bodyPr wrap="square" rtlCol="0">
+            <a:spAutoFit/>
+          </a:bodyPr>
+          <a:lstStyle/>
+          <a:p>
+            <a:pPr algn="ctr"/>
+            <a:r>
+              <a:rPr lang="de-DE" sz="2400" dirty="0"/>
+              <a:t>T2</a:t>
+            </a:r>
+            <a:endParaRPr lang="de-DE" sz="2400" baseline="-25000" dirty="0"/>
+          </a:p>
+        </p:txBody>
+      </p:sp>
+      <p:sp>
+        <p:nvSpPr>
+          <p:cNvPr id="30" name="Textfeld 29">
+            <a:extLst>
+              <a:ext uri="{FF2B5EF4-FFF2-40B4-BE49-F238E27FC236}">
+                <a16:creationId xmlns:a16="http://schemas.microsoft.com/office/drawing/2014/main" id="{9DF517D6-2BB1-AD96-5555-FE3965B7BB02}"/>
+              </a:ext>
+            </a:extLst>
+          </p:cNvPr>
+          <p:cNvSpPr txBox="1"/>
+          <p:nvPr/>
+        </p:nvSpPr>
+        <p:spPr>
+          <a:xfrm>
+            <a:off x="10621978" y="653128"/>
+            <a:ext cx="627321" cy="461665"/>
+          </a:xfrm>
+          <a:prstGeom prst="rect">
+            <a:avLst/>
+          </a:prstGeom>
+          <a:noFill/>
+        </p:spPr>
+        <p:txBody>
+          <a:bodyPr wrap="square" rtlCol="0">
+            <a:spAutoFit/>
+          </a:bodyPr>
+          <a:lstStyle/>
+          <a:p>
+            <a:pPr algn="ctr"/>
+            <a:r>
+              <a:rPr lang="de-DE" sz="2400" dirty="0"/>
+              <a:t>B</a:t>
+            </a:r>
+            <a:r>
+              <a:rPr lang="de-DE" sz="2400" baseline="-25000" dirty="0"/>
+              <a:t>1</a:t>
+            </a:r>
+          </a:p>
+        </p:txBody>
+      </p:sp>
+      <p:sp>
+        <p:nvSpPr>
+          <p:cNvPr id="31" name="Textfeld 30">
+            <a:extLst>
+              <a:ext uri="{FF2B5EF4-FFF2-40B4-BE49-F238E27FC236}">
+                <a16:creationId xmlns:a16="http://schemas.microsoft.com/office/drawing/2014/main" id="{B17AA15F-1B4E-C1A0-85BD-2C20FDDAF529}"/>
+              </a:ext>
+            </a:extLst>
+          </p:cNvPr>
+          <p:cNvSpPr txBox="1"/>
+          <p:nvPr/>
+        </p:nvSpPr>
+        <p:spPr>
+          <a:xfrm>
+            <a:off x="8114522" y="652013"/>
+            <a:ext cx="627321" cy="461665"/>
+          </a:xfrm>
+          <a:prstGeom prst="rect">
+            <a:avLst/>
+          </a:prstGeom>
+          <a:noFill/>
+        </p:spPr>
+        <p:txBody>
+          <a:bodyPr wrap="square" rtlCol="0">
+            <a:spAutoFit/>
+          </a:bodyPr>
+          <a:lstStyle/>
+          <a:p>
+            <a:pPr algn="ctr"/>
+            <a:r>
+              <a:rPr lang="de-DE" sz="2400" dirty="0"/>
+              <a:t>A</a:t>
+            </a:r>
+            <a:r>
+              <a:rPr lang="de-DE" sz="2400" baseline="-25000" dirty="0"/>
+              <a:t>0</a:t>
+            </a:r>
+          </a:p>
+        </p:txBody>
+      </p:sp>
+      <p:sp>
+        <p:nvSpPr>
+          <p:cNvPr id="32" name="Textfeld 31">
+            <a:extLst>
+              <a:ext uri="{FF2B5EF4-FFF2-40B4-BE49-F238E27FC236}">
+                <a16:creationId xmlns:a16="http://schemas.microsoft.com/office/drawing/2014/main" id="{963760E1-8D40-9A72-6454-A1FBC206E0B5}"/>
+              </a:ext>
+            </a:extLst>
+          </p:cNvPr>
+          <p:cNvSpPr txBox="1"/>
+          <p:nvPr/>
+        </p:nvSpPr>
+        <p:spPr>
+          <a:xfrm>
+            <a:off x="8784982" y="652012"/>
+            <a:ext cx="627321" cy="461665"/>
+          </a:xfrm>
+          <a:prstGeom prst="rect">
+            <a:avLst/>
+          </a:prstGeom>
+          <a:noFill/>
+        </p:spPr>
+        <p:txBody>
+          <a:bodyPr wrap="square" rtlCol="0">
+            <a:spAutoFit/>
+          </a:bodyPr>
+          <a:lstStyle/>
+          <a:p>
+            <a:pPr algn="ctr"/>
+            <a:r>
+              <a:rPr lang="de-DE" sz="2400" dirty="0"/>
+              <a:t>A</a:t>
+            </a:r>
+            <a:r>
+              <a:rPr lang="de-DE" sz="2400" baseline="-25000" dirty="0"/>
+              <a:t>1</a:t>
+            </a:r>
+          </a:p>
+        </p:txBody>
+      </p:sp>
+      <p:sp>
+        <p:nvSpPr>
+          <p:cNvPr id="33" name="Textfeld 32">
+            <a:extLst>
+              <a:ext uri="{FF2B5EF4-FFF2-40B4-BE49-F238E27FC236}">
+                <a16:creationId xmlns:a16="http://schemas.microsoft.com/office/drawing/2014/main" id="{29EC0545-63CD-67D4-31DF-8C286098FCAE}"/>
+              </a:ext>
+            </a:extLst>
+          </p:cNvPr>
+          <p:cNvSpPr txBox="1"/>
+          <p:nvPr/>
+        </p:nvSpPr>
+        <p:spPr>
+          <a:xfrm>
+            <a:off x="9373498" y="660051"/>
+            <a:ext cx="627321" cy="461665"/>
+          </a:xfrm>
+          <a:prstGeom prst="rect">
+            <a:avLst/>
+          </a:prstGeom>
+          <a:noFill/>
+        </p:spPr>
+        <p:txBody>
+          <a:bodyPr wrap="square" rtlCol="0">
+            <a:spAutoFit/>
+          </a:bodyPr>
+          <a:lstStyle/>
+          <a:p>
+            <a:pPr algn="ctr"/>
+            <a:r>
+              <a:rPr lang="de-DE" sz="2400" dirty="0"/>
+              <a:t>A</a:t>
+            </a:r>
+            <a:r>
+              <a:rPr lang="de-DE" sz="2400" baseline="-25000" dirty="0"/>
+              <a:t>2</a:t>
+            </a:r>
+          </a:p>
+        </p:txBody>
+      </p:sp>
+      <p:sp>
+        <p:nvSpPr>
+          <p:cNvPr id="34" name="Textfeld 33">
+            <a:extLst>
+              <a:ext uri="{FF2B5EF4-FFF2-40B4-BE49-F238E27FC236}">
+                <a16:creationId xmlns:a16="http://schemas.microsoft.com/office/drawing/2014/main" id="{3F5B8D24-09DC-91E6-9928-E4FBBBBECCC7}"/>
+              </a:ext>
+            </a:extLst>
+          </p:cNvPr>
+          <p:cNvSpPr txBox="1"/>
+          <p:nvPr/>
+        </p:nvSpPr>
+        <p:spPr>
+          <a:xfrm>
+            <a:off x="5685003" y="4966424"/>
+            <a:ext cx="627321" cy="461665"/>
+          </a:xfrm>
+          <a:prstGeom prst="rect">
+            <a:avLst/>
+          </a:prstGeom>
+          <a:noFill/>
+        </p:spPr>
+        <p:txBody>
+          <a:bodyPr wrap="square" rtlCol="0">
+            <a:spAutoFit/>
+          </a:bodyPr>
+          <a:lstStyle/>
+          <a:p>
+            <a:pPr algn="ctr"/>
+            <a:r>
+              <a:rPr lang="de-DE" sz="2400" dirty="0"/>
+              <a:t>B</a:t>
+            </a:r>
+            <a:r>
+              <a:rPr lang="de-DE" sz="2400" baseline="-25000" dirty="0"/>
+              <a:t>0</a:t>
+            </a:r>
+          </a:p>
+        </p:txBody>
+      </p:sp>
+      <p:sp>
+        <p:nvSpPr>
+          <p:cNvPr id="35" name="Textfeld 34">
+            <a:extLst>
+              <a:ext uri="{FF2B5EF4-FFF2-40B4-BE49-F238E27FC236}">
+                <a16:creationId xmlns:a16="http://schemas.microsoft.com/office/drawing/2014/main" id="{07C34379-677C-4C05-8F7F-BA57A28CBCDB}"/>
+              </a:ext>
+            </a:extLst>
+          </p:cNvPr>
+          <p:cNvSpPr txBox="1"/>
+          <p:nvPr/>
+        </p:nvSpPr>
+        <p:spPr>
+          <a:xfrm>
+            <a:off x="5668128" y="5607173"/>
+            <a:ext cx="627321" cy="461665"/>
+          </a:xfrm>
+          <a:prstGeom prst="rect">
+            <a:avLst/>
+          </a:prstGeom>
+          <a:noFill/>
+        </p:spPr>
+        <p:txBody>
+          <a:bodyPr wrap="square" rtlCol="0">
+            <a:spAutoFit/>
+          </a:bodyPr>
+          <a:lstStyle/>
+          <a:p>
+            <a:pPr algn="ctr"/>
+            <a:r>
+              <a:rPr lang="de-DE" sz="2400" dirty="0"/>
+              <a:t>B</a:t>
+            </a:r>
+            <a:r>
+              <a:rPr lang="de-DE" sz="2400" baseline="-25000" dirty="0"/>
+              <a:t>1</a:t>
+            </a:r>
+          </a:p>
+        </p:txBody>
+      </p:sp>
+      <p:sp>
+        <p:nvSpPr>
+          <p:cNvPr id="36" name="Textfeld 35">
+            <a:extLst>
+              <a:ext uri="{FF2B5EF4-FFF2-40B4-BE49-F238E27FC236}">
+                <a16:creationId xmlns:a16="http://schemas.microsoft.com/office/drawing/2014/main" id="{EF8273E5-9197-3777-CB7D-CD570ED6AFC1}"/>
+              </a:ext>
+            </a:extLst>
+          </p:cNvPr>
+          <p:cNvSpPr txBox="1"/>
+          <p:nvPr/>
+        </p:nvSpPr>
+        <p:spPr>
+          <a:xfrm>
+            <a:off x="5685003" y="3077695"/>
+            <a:ext cx="627321" cy="461665"/>
+          </a:xfrm>
+          <a:prstGeom prst="rect">
+            <a:avLst/>
+          </a:prstGeom>
+          <a:noFill/>
+        </p:spPr>
+        <p:txBody>
+          <a:bodyPr wrap="square" rtlCol="0">
+            <a:spAutoFit/>
+          </a:bodyPr>
+          <a:lstStyle/>
+          <a:p>
+            <a:pPr algn="ctr"/>
+            <a:r>
+              <a:rPr lang="de-DE" sz="2400" dirty="0"/>
+              <a:t>A</a:t>
+            </a:r>
+            <a:r>
+              <a:rPr lang="de-DE" sz="2400" baseline="-25000" dirty="0"/>
+              <a:t>0</a:t>
+            </a:r>
+          </a:p>
+        </p:txBody>
+      </p:sp>
+      <p:sp>
+        <p:nvSpPr>
+          <p:cNvPr id="37" name="Textfeld 36">
+            <a:extLst>
+              <a:ext uri="{FF2B5EF4-FFF2-40B4-BE49-F238E27FC236}">
+                <a16:creationId xmlns:a16="http://schemas.microsoft.com/office/drawing/2014/main" id="{F238FDE7-763E-0784-332D-53AD27AF63D4}"/>
+              </a:ext>
+            </a:extLst>
+          </p:cNvPr>
+          <p:cNvSpPr txBox="1"/>
+          <p:nvPr/>
+        </p:nvSpPr>
+        <p:spPr>
+          <a:xfrm>
+            <a:off x="5685003" y="3718444"/>
+            <a:ext cx="627321" cy="461665"/>
+          </a:xfrm>
+          <a:prstGeom prst="rect">
+            <a:avLst/>
+          </a:prstGeom>
+          <a:noFill/>
+        </p:spPr>
+        <p:txBody>
+          <a:bodyPr wrap="square" rtlCol="0">
+            <a:spAutoFit/>
+          </a:bodyPr>
+          <a:lstStyle/>
+          <a:p>
+            <a:pPr algn="ctr"/>
+            <a:r>
+              <a:rPr lang="de-DE" sz="2400" dirty="0"/>
+              <a:t>A</a:t>
+            </a:r>
+            <a:r>
+              <a:rPr lang="de-DE" sz="2400" baseline="-25000" dirty="0"/>
+              <a:t>1</a:t>
+            </a:r>
+          </a:p>
+        </p:txBody>
+      </p:sp>
+      <p:sp>
+        <p:nvSpPr>
+          <p:cNvPr id="38" name="Textfeld 37">
+            <a:extLst>
+              <a:ext uri="{FF2B5EF4-FFF2-40B4-BE49-F238E27FC236}">
+                <a16:creationId xmlns:a16="http://schemas.microsoft.com/office/drawing/2014/main" id="{28559D58-D117-5976-48BD-14CCE7BE038B}"/>
+              </a:ext>
+            </a:extLst>
+          </p:cNvPr>
+          <p:cNvSpPr txBox="1"/>
+          <p:nvPr/>
+        </p:nvSpPr>
+        <p:spPr>
+          <a:xfrm>
+            <a:off x="5668129" y="4359193"/>
+            <a:ext cx="627321" cy="461665"/>
+          </a:xfrm>
+          <a:prstGeom prst="rect">
+            <a:avLst/>
+          </a:prstGeom>
+          <a:noFill/>
+        </p:spPr>
+        <p:txBody>
+          <a:bodyPr wrap="square" rtlCol="0">
+            <a:spAutoFit/>
+          </a:bodyPr>
+          <a:lstStyle/>
+          <a:p>
+            <a:pPr algn="ctr"/>
+            <a:r>
+              <a:rPr lang="de-DE" sz="2400" dirty="0"/>
+              <a:t>A</a:t>
+            </a:r>
+            <a:r>
+              <a:rPr lang="de-DE" sz="2400" baseline="-25000" dirty="0"/>
+              <a:t>2</a:t>
+            </a:r>
+          </a:p>
+        </p:txBody>
+      </p:sp>
+      <p:sp>
+        <p:nvSpPr>
+          <p:cNvPr id="2" name="Pfeil: nach rechts 1">
+            <a:extLst>
+              <a:ext uri="{FF2B5EF4-FFF2-40B4-BE49-F238E27FC236}">
+                <a16:creationId xmlns:a16="http://schemas.microsoft.com/office/drawing/2014/main" id="{561A8CD1-0B50-657D-709E-69B26EFC07AE}"/>
+              </a:ext>
+            </a:extLst>
+          </p:cNvPr>
+          <p:cNvSpPr/>
+          <p:nvPr/>
+        </p:nvSpPr>
+        <p:spPr>
+          <a:xfrm>
+            <a:off x="4947920" y="3215756"/>
+            <a:ext cx="627321" cy="863411"/>
+          </a:xfrm>
+          <a:prstGeom prst="rightArrow">
+            <a:avLst/>
+          </a:prstGeom>
+          <a:solidFill>
+            <a:schemeClr val="bg1">
+              <a:lumMod val="95000"/>
+            </a:schemeClr>
+          </a:solidFill>
+        </p:spPr>
+        <p:style>
+          <a:lnRef idx="2">
+            <a:schemeClr val="accent1">
+              <a:shade val="15000"/>
+            </a:schemeClr>
+          </a:lnRef>
+          <a:fillRef idx="1">
+            <a:schemeClr val="accent1"/>
+          </a:fillRef>
+          <a:effectRef idx="0">
+            <a:schemeClr val="accent1"/>
+          </a:effectRef>
+          <a:fontRef idx="minor">
+            <a:schemeClr val="lt1"/>
+          </a:fontRef>
+        </p:style>
+        <p:txBody>
+          <a:bodyPr rtlCol="0" anchor="ctr"/>
+          <a:lstStyle/>
+          <a:p>
+            <a:pPr algn="ctr"/>
+            <a:endParaRPr lang="de-DE"/>
+          </a:p>
+        </p:txBody>
+      </p:sp>
+      <p:cxnSp>
+        <p:nvCxnSpPr>
+          <p:cNvPr id="18" name="Gerader Verbinder 17">
+            <a:extLst>
+              <a:ext uri="{FF2B5EF4-FFF2-40B4-BE49-F238E27FC236}">
+                <a16:creationId xmlns:a16="http://schemas.microsoft.com/office/drawing/2014/main" id="{59C7090B-FE3A-8445-44F1-721FC9C177D1}"/>
+              </a:ext>
+            </a:extLst>
+          </p:cNvPr>
+          <p:cNvCxnSpPr/>
+          <p:nvPr/>
+        </p:nvCxnSpPr>
+        <p:spPr>
+          <a:xfrm>
+            <a:off x="5685003" y="4925784"/>
+            <a:ext cx="525554" cy="0"/>
+          </a:xfrm>
+          <a:prstGeom prst="line">
+            <a:avLst/>
+          </a:prstGeom>
+          <a:ln w="38100">
+            <a:solidFill>
+              <a:schemeClr val="tx1"/>
+            </a:solidFill>
+          </a:ln>
+        </p:spPr>
+        <p:style>
+          <a:lnRef idx="2">
+            <a:schemeClr val="accent1"/>
+          </a:lnRef>
+          <a:fillRef idx="0">
+            <a:schemeClr val="accent1"/>
+          </a:fillRef>
+          <a:effectRef idx="1">
+            <a:schemeClr val="accent1"/>
+          </a:effectRef>
+          <a:fontRef idx="minor">
+            <a:schemeClr val="tx1"/>
+          </a:fontRef>
+        </p:style>
+      </p:cxnSp>
+      <p:cxnSp>
+        <p:nvCxnSpPr>
+          <p:cNvPr id="22" name="Gerader Verbinder 21">
+            <a:extLst>
+              <a:ext uri="{FF2B5EF4-FFF2-40B4-BE49-F238E27FC236}">
+                <a16:creationId xmlns:a16="http://schemas.microsoft.com/office/drawing/2014/main" id="{36003E21-70EF-B4D0-4486-A88D2A3C9804}"/>
+              </a:ext>
+            </a:extLst>
+          </p:cNvPr>
+          <p:cNvCxnSpPr/>
+          <p:nvPr/>
+        </p:nvCxnSpPr>
+        <p:spPr>
+          <a:xfrm>
+            <a:off x="5691765" y="3035239"/>
+            <a:ext cx="525554" cy="0"/>
+          </a:xfrm>
+          <a:prstGeom prst="line">
+            <a:avLst/>
+          </a:prstGeom>
+          <a:ln w="38100">
+            <a:solidFill>
+              <a:schemeClr val="tx1"/>
+            </a:solidFill>
+          </a:ln>
+        </p:spPr>
+        <p:style>
+          <a:lnRef idx="2">
+            <a:schemeClr val="accent1"/>
+          </a:lnRef>
+          <a:fillRef idx="0">
+            <a:schemeClr val="accent1"/>
+          </a:fillRef>
+          <a:effectRef idx="1">
+            <a:schemeClr val="accent1"/>
+          </a:effectRef>
+          <a:fontRef idx="minor">
+            <a:schemeClr val="tx1"/>
+          </a:fontRef>
+        </p:style>
+      </p:cxnSp>
+      <p:cxnSp>
+        <p:nvCxnSpPr>
+          <p:cNvPr id="27" name="Gerader Verbinder 26">
+            <a:extLst>
+              <a:ext uri="{FF2B5EF4-FFF2-40B4-BE49-F238E27FC236}">
+                <a16:creationId xmlns:a16="http://schemas.microsoft.com/office/drawing/2014/main" id="{E8291FE1-62A2-806C-2472-B55895EAD554}"/>
+              </a:ext>
+            </a:extLst>
+          </p:cNvPr>
+          <p:cNvCxnSpPr/>
+          <p:nvPr/>
+        </p:nvCxnSpPr>
+        <p:spPr>
+          <a:xfrm>
+            <a:off x="873929" y="3929319"/>
+            <a:ext cx="525554" cy="0"/>
+          </a:xfrm>
+          <a:prstGeom prst="line">
+            <a:avLst/>
+          </a:prstGeom>
+          <a:ln w="38100">
+            <a:solidFill>
+              <a:schemeClr val="tx1"/>
+            </a:solidFill>
+          </a:ln>
+        </p:spPr>
+        <p:style>
+          <a:lnRef idx="2">
+            <a:schemeClr val="accent1"/>
+          </a:lnRef>
+          <a:fillRef idx="0">
+            <a:schemeClr val="accent1"/>
+          </a:fillRef>
+          <a:effectRef idx="1">
+            <a:schemeClr val="accent1"/>
+          </a:effectRef>
+          <a:fontRef idx="minor">
+            <a:schemeClr val="tx1"/>
+          </a:fontRef>
+        </p:style>
+      </p:cxnSp>
+      <p:cxnSp>
+        <p:nvCxnSpPr>
+          <p:cNvPr id="28" name="Gerader Verbinder 27">
+            <a:extLst>
+              <a:ext uri="{FF2B5EF4-FFF2-40B4-BE49-F238E27FC236}">
+                <a16:creationId xmlns:a16="http://schemas.microsoft.com/office/drawing/2014/main" id="{6228F8A8-825D-B207-1C97-3503C7A017B8}"/>
+              </a:ext>
+            </a:extLst>
+          </p:cNvPr>
+          <p:cNvCxnSpPr/>
+          <p:nvPr/>
+        </p:nvCxnSpPr>
+        <p:spPr>
+          <a:xfrm>
+            <a:off x="873929" y="4599476"/>
+            <a:ext cx="525554" cy="0"/>
+          </a:xfrm>
+          <a:prstGeom prst="line">
+            <a:avLst/>
+          </a:prstGeom>
+          <a:ln w="38100">
+            <a:solidFill>
+              <a:schemeClr val="tx1"/>
+            </a:solidFill>
+          </a:ln>
+        </p:spPr>
+        <p:style>
+          <a:lnRef idx="2">
+            <a:schemeClr val="accent1"/>
+          </a:lnRef>
+          <a:fillRef idx="0">
+            <a:schemeClr val="accent1"/>
+          </a:fillRef>
+          <a:effectRef idx="1">
+            <a:schemeClr val="accent1"/>
+          </a:effectRef>
+          <a:fontRef idx="minor">
+            <a:schemeClr val="tx1"/>
+          </a:fontRef>
+        </p:style>
+      </p:cxnSp>
+      <p:cxnSp>
+        <p:nvCxnSpPr>
+          <p:cNvPr id="29" name="Gerader Verbinder 28">
+            <a:extLst>
+              <a:ext uri="{FF2B5EF4-FFF2-40B4-BE49-F238E27FC236}">
+                <a16:creationId xmlns:a16="http://schemas.microsoft.com/office/drawing/2014/main" id="{9805B1D5-17F6-AA65-F3C9-CBCA87398EAF}"/>
+              </a:ext>
+            </a:extLst>
+          </p:cNvPr>
+          <p:cNvCxnSpPr>
+            <a:cxnSpLocks/>
+          </p:cNvCxnSpPr>
+          <p:nvPr/>
+        </p:nvCxnSpPr>
+        <p:spPr>
+          <a:xfrm>
+            <a:off x="3299527" y="1584845"/>
+            <a:ext cx="0" cy="463553"/>
+          </a:xfrm>
+          <a:prstGeom prst="line">
+            <a:avLst/>
+          </a:prstGeom>
+          <a:ln w="38100">
+            <a:solidFill>
+              <a:schemeClr val="tx1"/>
+            </a:solidFill>
+          </a:ln>
+        </p:spPr>
+        <p:style>
+          <a:lnRef idx="2">
+            <a:schemeClr val="accent1"/>
+          </a:lnRef>
+          <a:fillRef idx="0">
+            <a:schemeClr val="accent1"/>
+          </a:fillRef>
+          <a:effectRef idx="1">
+            <a:schemeClr val="accent1"/>
+          </a:effectRef>
+          <a:fontRef idx="minor">
+            <a:schemeClr val="tx1"/>
+          </a:fontRef>
+        </p:style>
+      </p:cxnSp>
+      <p:cxnSp>
+        <p:nvCxnSpPr>
+          <p:cNvPr id="40" name="Gerader Verbinder 39">
+            <a:extLst>
+              <a:ext uri="{FF2B5EF4-FFF2-40B4-BE49-F238E27FC236}">
+                <a16:creationId xmlns:a16="http://schemas.microsoft.com/office/drawing/2014/main" id="{1C6F74F1-E703-43A0-9C3B-2E4E51FC1277}"/>
+              </a:ext>
+            </a:extLst>
+          </p:cNvPr>
+          <p:cNvCxnSpPr>
+            <a:cxnSpLocks/>
+          </p:cNvCxnSpPr>
+          <p:nvPr/>
+        </p:nvCxnSpPr>
+        <p:spPr>
+          <a:xfrm>
+            <a:off x="3936795" y="1584845"/>
+            <a:ext cx="0" cy="463553"/>
+          </a:xfrm>
+          <a:prstGeom prst="line">
+            <a:avLst/>
+          </a:prstGeom>
+          <a:ln w="38100">
+            <a:solidFill>
+              <a:schemeClr val="tx1"/>
+            </a:solidFill>
+          </a:ln>
+        </p:spPr>
+        <p:style>
+          <a:lnRef idx="2">
+            <a:schemeClr val="accent1"/>
+          </a:lnRef>
+          <a:fillRef idx="0">
+            <a:schemeClr val="accent1"/>
+          </a:fillRef>
+          <a:effectRef idx="1">
+            <a:schemeClr val="accent1"/>
+          </a:effectRef>
+          <a:fontRef idx="minor">
+            <a:schemeClr val="tx1"/>
+          </a:fontRef>
+        </p:style>
+      </p:cxnSp>
+      <p:cxnSp>
+        <p:nvCxnSpPr>
+          <p:cNvPr id="41" name="Gerader Verbinder 40">
+            <a:extLst>
+              <a:ext uri="{FF2B5EF4-FFF2-40B4-BE49-F238E27FC236}">
+                <a16:creationId xmlns:a16="http://schemas.microsoft.com/office/drawing/2014/main" id="{5609CD7E-14B2-5FAB-8A26-373E20C4C6FD}"/>
+              </a:ext>
+            </a:extLst>
+          </p:cNvPr>
+          <p:cNvCxnSpPr>
+            <a:cxnSpLocks/>
+          </p:cNvCxnSpPr>
+          <p:nvPr/>
+        </p:nvCxnSpPr>
+        <p:spPr>
+          <a:xfrm>
+            <a:off x="8119397" y="660051"/>
+            <a:ext cx="0" cy="463553"/>
+          </a:xfrm>
+          <a:prstGeom prst="line">
+            <a:avLst/>
+          </a:prstGeom>
+          <a:ln w="38100">
+            <a:solidFill>
+              <a:schemeClr val="tx1"/>
+            </a:solidFill>
+          </a:ln>
+        </p:spPr>
+        <p:style>
+          <a:lnRef idx="2">
+            <a:schemeClr val="accent1"/>
+          </a:lnRef>
+          <a:fillRef idx="0">
+            <a:schemeClr val="accent1"/>
+          </a:fillRef>
+          <a:effectRef idx="1">
+            <a:schemeClr val="accent1"/>
+          </a:effectRef>
+          <a:fontRef idx="minor">
+            <a:schemeClr val="tx1"/>
+          </a:fontRef>
+        </p:style>
+      </p:cxnSp>
+      <p:cxnSp>
+        <p:nvCxnSpPr>
+          <p:cNvPr id="42" name="Gerader Verbinder 41">
+            <a:extLst>
+              <a:ext uri="{FF2B5EF4-FFF2-40B4-BE49-F238E27FC236}">
+                <a16:creationId xmlns:a16="http://schemas.microsoft.com/office/drawing/2014/main" id="{3129EA80-4752-70FC-92FC-6A2A473E9196}"/>
+              </a:ext>
+            </a:extLst>
+          </p:cNvPr>
+          <p:cNvCxnSpPr>
+            <a:cxnSpLocks/>
+          </p:cNvCxnSpPr>
+          <p:nvPr/>
+        </p:nvCxnSpPr>
+        <p:spPr>
+          <a:xfrm>
+            <a:off x="10000819" y="650124"/>
+            <a:ext cx="0" cy="463553"/>
+          </a:xfrm>
+          <a:prstGeom prst="line">
+            <a:avLst/>
+          </a:prstGeom>
+          <a:ln w="38100">
+            <a:solidFill>
+              <a:schemeClr val="tx1"/>
+            </a:solidFill>
+          </a:ln>
+        </p:spPr>
+        <p:style>
+          <a:lnRef idx="2">
+            <a:schemeClr val="accent1"/>
+          </a:lnRef>
+          <a:fillRef idx="0">
+            <a:schemeClr val="accent1"/>
+          </a:fillRef>
+          <a:effectRef idx="1">
+            <a:schemeClr val="accent1"/>
+          </a:effectRef>
+          <a:fontRef idx="minor">
+            <a:schemeClr val="tx1"/>
+          </a:fontRef>
+        </p:style>
+      </p:cxnSp>
+      <p:sp>
+        <p:nvSpPr>
+          <p:cNvPr id="43" name="Textfeld 42">
+            <a:extLst>
+              <a:ext uri="{FF2B5EF4-FFF2-40B4-BE49-F238E27FC236}">
+                <a16:creationId xmlns:a16="http://schemas.microsoft.com/office/drawing/2014/main" id="{EF018F0B-52F0-8473-00DC-56574660AB64}"/>
+              </a:ext>
+            </a:extLst>
+          </p:cNvPr>
+          <p:cNvSpPr txBox="1"/>
+          <p:nvPr/>
+        </p:nvSpPr>
+        <p:spPr>
+          <a:xfrm>
+            <a:off x="4564116" y="4059578"/>
+            <a:ext cx="1275572" cy="369332"/>
+          </a:xfrm>
+          <a:prstGeom prst="rect">
+            <a:avLst/>
+          </a:prstGeom>
+          <a:noFill/>
+        </p:spPr>
+        <p:txBody>
+          <a:bodyPr wrap="square" rtlCol="0">
+            <a:spAutoFit/>
+          </a:bodyPr>
+          <a:lstStyle/>
+          <a:p>
+            <a:pPr algn="ctr"/>
+            <a:r>
+              <a:rPr lang="de-DE" dirty="0"/>
+              <a:t>splitting</a:t>
+            </a:r>
+          </a:p>
+        </p:txBody>
+      </p:sp>
+      <p:sp>
+        <p:nvSpPr>
+          <p:cNvPr id="39" name="Multiplikationszeichen 38">
+            <a:extLst>
+              <a:ext uri="{FF2B5EF4-FFF2-40B4-BE49-F238E27FC236}">
+                <a16:creationId xmlns:a16="http://schemas.microsoft.com/office/drawing/2014/main" id="{34FFCC32-A00F-32BE-9AC9-12394E610129}"/>
+              </a:ext>
+            </a:extLst>
+          </p:cNvPr>
+          <p:cNvSpPr/>
+          <p:nvPr/>
+        </p:nvSpPr>
+        <p:spPr>
+          <a:xfrm>
+            <a:off x="6709386" y="1616249"/>
+            <a:ext cx="900000" cy="900000"/>
+          </a:xfrm>
+          <a:prstGeom prst="mathMultiply">
+            <a:avLst>
+              <a:gd name="adj1" fmla="val 1663"/>
+            </a:avLst>
+          </a:prstGeom>
+          <a:noFill/>
+          <a:ln>
+            <a:solidFill>
+              <a:schemeClr val="bg1">
+                <a:lumMod val="65000"/>
+              </a:schemeClr>
+            </a:solidFill>
+          </a:ln>
+        </p:spPr>
+        <p:style>
+          <a:lnRef idx="2">
+            <a:schemeClr val="accent1">
+              <a:shade val="15000"/>
+            </a:schemeClr>
+          </a:lnRef>
+          <a:fillRef idx="1">
+            <a:schemeClr val="accent1"/>
+          </a:fillRef>
+          <a:effectRef idx="0">
+            <a:schemeClr val="accent1"/>
+          </a:effectRef>
+          <a:fontRef idx="minor">
+            <a:schemeClr val="lt1"/>
+          </a:fontRef>
+        </p:style>
+        <p:txBody>
+          <a:bodyPr rtlCol="0" anchor="ctr"/>
+          <a:lstStyle/>
+          <a:p>
+            <a:pPr algn="ctr"/>
+            <a:endParaRPr lang="de-DE"/>
+          </a:p>
+        </p:txBody>
+      </p:sp>
+      <p:sp>
+        <p:nvSpPr>
+          <p:cNvPr id="44" name="Multiplikationszeichen 43">
+            <a:extLst>
+              <a:ext uri="{FF2B5EF4-FFF2-40B4-BE49-F238E27FC236}">
+                <a16:creationId xmlns:a16="http://schemas.microsoft.com/office/drawing/2014/main" id="{C638670D-7528-FCF0-0A89-10146F99A1DB}"/>
+              </a:ext>
+            </a:extLst>
+          </p:cNvPr>
+          <p:cNvSpPr/>
+          <p:nvPr/>
+        </p:nvSpPr>
+        <p:spPr>
+          <a:xfrm>
+            <a:off x="6076982" y="981952"/>
+            <a:ext cx="900000" cy="900000"/>
+          </a:xfrm>
+          <a:prstGeom prst="mathMultiply">
+            <a:avLst>
+              <a:gd name="adj1" fmla="val 1663"/>
+            </a:avLst>
+          </a:prstGeom>
+          <a:noFill/>
+          <a:ln>
+            <a:solidFill>
+              <a:schemeClr val="bg1">
+                <a:lumMod val="65000"/>
+              </a:schemeClr>
+            </a:solidFill>
+          </a:ln>
+        </p:spPr>
+        <p:style>
+          <a:lnRef idx="2">
+            <a:schemeClr val="accent1">
+              <a:shade val="15000"/>
+            </a:schemeClr>
+          </a:lnRef>
+          <a:fillRef idx="1">
+            <a:schemeClr val="accent1"/>
+          </a:fillRef>
+          <a:effectRef idx="0">
+            <a:schemeClr val="accent1"/>
+          </a:effectRef>
+          <a:fontRef idx="minor">
+            <a:schemeClr val="lt1"/>
+          </a:fontRef>
+        </p:style>
+        <p:txBody>
+          <a:bodyPr rtlCol="0" anchor="ctr"/>
+          <a:lstStyle/>
+          <a:p>
+            <a:pPr algn="ctr"/>
+            <a:endParaRPr lang="de-DE"/>
+          </a:p>
+        </p:txBody>
+      </p:sp>
+      <p:sp>
+        <p:nvSpPr>
+          <p:cNvPr id="45" name="Multiplikationszeichen 44">
+            <a:extLst>
+              <a:ext uri="{FF2B5EF4-FFF2-40B4-BE49-F238E27FC236}">
+                <a16:creationId xmlns:a16="http://schemas.microsoft.com/office/drawing/2014/main" id="{2924A0CF-B5D4-3545-C282-137DE09B46D3}"/>
+              </a:ext>
+            </a:extLst>
+          </p:cNvPr>
+          <p:cNvSpPr/>
+          <p:nvPr/>
+        </p:nvSpPr>
+        <p:spPr>
+          <a:xfrm>
+            <a:off x="7975436" y="2874500"/>
+            <a:ext cx="900000" cy="900000"/>
+          </a:xfrm>
+          <a:prstGeom prst="mathMultiply">
+            <a:avLst>
+              <a:gd name="adj1" fmla="val 1663"/>
+            </a:avLst>
+          </a:prstGeom>
+          <a:noFill/>
+          <a:ln>
+            <a:solidFill>
+              <a:schemeClr val="bg1">
+                <a:lumMod val="65000"/>
+              </a:schemeClr>
+            </a:solidFill>
+          </a:ln>
+        </p:spPr>
+        <p:style>
+          <a:lnRef idx="2">
+            <a:schemeClr val="accent1">
+              <a:shade val="15000"/>
+            </a:schemeClr>
+          </a:lnRef>
+          <a:fillRef idx="1">
+            <a:schemeClr val="accent1"/>
+          </a:fillRef>
+          <a:effectRef idx="0">
+            <a:schemeClr val="accent1"/>
+          </a:effectRef>
+          <a:fontRef idx="minor">
+            <a:schemeClr val="lt1"/>
+          </a:fontRef>
+        </p:style>
+        <p:txBody>
+          <a:bodyPr rtlCol="0" anchor="ctr"/>
+          <a:lstStyle/>
+          <a:p>
+            <a:pPr algn="ctr"/>
+            <a:endParaRPr lang="de-DE"/>
+          </a:p>
+        </p:txBody>
+      </p:sp>
+      <p:sp>
+        <p:nvSpPr>
+          <p:cNvPr id="46" name="Multiplikationszeichen 45">
+            <a:extLst>
+              <a:ext uri="{FF2B5EF4-FFF2-40B4-BE49-F238E27FC236}">
+                <a16:creationId xmlns:a16="http://schemas.microsoft.com/office/drawing/2014/main" id="{E315C379-1043-6B8F-6A08-AE91F9E1542E}"/>
+              </a:ext>
+            </a:extLst>
+          </p:cNvPr>
+          <p:cNvSpPr/>
+          <p:nvPr/>
+        </p:nvSpPr>
+        <p:spPr>
+          <a:xfrm>
+            <a:off x="7343032" y="2240203"/>
+            <a:ext cx="900000" cy="900000"/>
+          </a:xfrm>
+          <a:prstGeom prst="mathMultiply">
+            <a:avLst>
+              <a:gd name="adj1" fmla="val 1663"/>
+            </a:avLst>
+          </a:prstGeom>
+          <a:noFill/>
+          <a:ln>
+            <a:solidFill>
+              <a:schemeClr val="bg1">
+                <a:lumMod val="65000"/>
+              </a:schemeClr>
+            </a:solidFill>
+          </a:ln>
+        </p:spPr>
+        <p:style>
+          <a:lnRef idx="2">
+            <a:schemeClr val="accent1">
+              <a:shade val="15000"/>
+            </a:schemeClr>
+          </a:lnRef>
+          <a:fillRef idx="1">
+            <a:schemeClr val="accent1"/>
+          </a:fillRef>
+          <a:effectRef idx="0">
+            <a:schemeClr val="accent1"/>
+          </a:effectRef>
+          <a:fontRef idx="minor">
+            <a:schemeClr val="lt1"/>
+          </a:fontRef>
+        </p:style>
+        <p:txBody>
+          <a:bodyPr rtlCol="0" anchor="ctr"/>
+          <a:lstStyle/>
+          <a:p>
+            <a:pPr algn="ctr"/>
+            <a:endParaRPr lang="de-DE"/>
+          </a:p>
+        </p:txBody>
+      </p:sp>
+      <p:sp>
+        <p:nvSpPr>
+          <p:cNvPr id="47" name="Multiplikationszeichen 46">
+            <a:extLst>
+              <a:ext uri="{FF2B5EF4-FFF2-40B4-BE49-F238E27FC236}">
+                <a16:creationId xmlns:a16="http://schemas.microsoft.com/office/drawing/2014/main" id="{E540067E-150F-2F0B-2D84-EC5979A0864E}"/>
+              </a:ext>
+            </a:extLst>
+          </p:cNvPr>
+          <p:cNvSpPr/>
+          <p:nvPr/>
+        </p:nvSpPr>
+        <p:spPr>
+          <a:xfrm>
+            <a:off x="9227318" y="4138325"/>
+            <a:ext cx="900000" cy="900000"/>
+          </a:xfrm>
+          <a:prstGeom prst="mathMultiply">
+            <a:avLst>
+              <a:gd name="adj1" fmla="val 1663"/>
+            </a:avLst>
+          </a:prstGeom>
+          <a:noFill/>
+          <a:ln>
+            <a:solidFill>
+              <a:schemeClr val="bg1">
+                <a:lumMod val="65000"/>
+              </a:schemeClr>
+            </a:solidFill>
+          </a:ln>
+        </p:spPr>
+        <p:style>
+          <a:lnRef idx="2">
+            <a:schemeClr val="accent1">
+              <a:shade val="15000"/>
+            </a:schemeClr>
+          </a:lnRef>
+          <a:fillRef idx="1">
+            <a:schemeClr val="accent1"/>
+          </a:fillRef>
+          <a:effectRef idx="0">
+            <a:schemeClr val="accent1"/>
+          </a:effectRef>
+          <a:fontRef idx="minor">
+            <a:schemeClr val="lt1"/>
+          </a:fontRef>
+        </p:style>
+        <p:txBody>
+          <a:bodyPr rtlCol="0" anchor="ctr"/>
+          <a:lstStyle/>
+          <a:p>
+            <a:pPr algn="ctr"/>
+            <a:endParaRPr lang="de-DE"/>
+          </a:p>
+        </p:txBody>
+      </p:sp>
+      <p:sp>
+        <p:nvSpPr>
+          <p:cNvPr id="48" name="Multiplikationszeichen 47">
+            <a:extLst>
+              <a:ext uri="{FF2B5EF4-FFF2-40B4-BE49-F238E27FC236}">
+                <a16:creationId xmlns:a16="http://schemas.microsoft.com/office/drawing/2014/main" id="{38D89D23-489A-BFF2-1F2C-C7D5AF0172B4}"/>
+              </a:ext>
+            </a:extLst>
+          </p:cNvPr>
+          <p:cNvSpPr/>
+          <p:nvPr/>
+        </p:nvSpPr>
+        <p:spPr>
+          <a:xfrm>
+            <a:off x="8594914" y="3504028"/>
+            <a:ext cx="900000" cy="900000"/>
+          </a:xfrm>
+          <a:prstGeom prst="mathMultiply">
+            <a:avLst>
+              <a:gd name="adj1" fmla="val 1663"/>
+            </a:avLst>
+          </a:prstGeom>
+          <a:noFill/>
+          <a:ln>
+            <a:solidFill>
+              <a:schemeClr val="bg1">
+                <a:lumMod val="65000"/>
+              </a:schemeClr>
+            </a:solidFill>
+          </a:ln>
+        </p:spPr>
+        <p:style>
+          <a:lnRef idx="2">
+            <a:schemeClr val="accent1">
+              <a:shade val="15000"/>
+            </a:schemeClr>
+          </a:lnRef>
+          <a:fillRef idx="1">
+            <a:schemeClr val="accent1"/>
+          </a:fillRef>
+          <a:effectRef idx="0">
+            <a:schemeClr val="accent1"/>
+          </a:effectRef>
+          <a:fontRef idx="minor">
+            <a:schemeClr val="lt1"/>
+          </a:fontRef>
+        </p:style>
+        <p:txBody>
+          <a:bodyPr rtlCol="0" anchor="ctr"/>
+          <a:lstStyle/>
+          <a:p>
+            <a:pPr algn="ctr"/>
+            <a:endParaRPr lang="de-DE"/>
+          </a:p>
+        </p:txBody>
+      </p:sp>
+      <p:sp>
+        <p:nvSpPr>
+          <p:cNvPr id="49" name="Multiplikationszeichen 48">
+            <a:extLst>
+              <a:ext uri="{FF2B5EF4-FFF2-40B4-BE49-F238E27FC236}">
+                <a16:creationId xmlns:a16="http://schemas.microsoft.com/office/drawing/2014/main" id="{762B96B7-C974-CF2F-AD80-FC67004875B9}"/>
+              </a:ext>
+            </a:extLst>
+          </p:cNvPr>
+          <p:cNvSpPr/>
+          <p:nvPr/>
+        </p:nvSpPr>
+        <p:spPr>
+          <a:xfrm>
+            <a:off x="10493368" y="5396576"/>
+            <a:ext cx="900000" cy="900000"/>
+          </a:xfrm>
+          <a:prstGeom prst="mathMultiply">
+            <a:avLst>
+              <a:gd name="adj1" fmla="val 1663"/>
+            </a:avLst>
+          </a:prstGeom>
+          <a:noFill/>
+          <a:ln>
+            <a:solidFill>
+              <a:schemeClr val="bg1">
+                <a:lumMod val="65000"/>
+              </a:schemeClr>
+            </a:solidFill>
+          </a:ln>
+        </p:spPr>
+        <p:style>
+          <a:lnRef idx="2">
+            <a:schemeClr val="accent1">
+              <a:shade val="15000"/>
+            </a:schemeClr>
+          </a:lnRef>
+          <a:fillRef idx="1">
+            <a:schemeClr val="accent1"/>
+          </a:fillRef>
+          <a:effectRef idx="0">
+            <a:schemeClr val="accent1"/>
+          </a:effectRef>
+          <a:fontRef idx="minor">
+            <a:schemeClr val="lt1"/>
+          </a:fontRef>
+        </p:style>
+        <p:txBody>
+          <a:bodyPr rtlCol="0" anchor="ctr"/>
+          <a:lstStyle/>
+          <a:p>
+            <a:pPr algn="ctr"/>
+            <a:endParaRPr lang="de-DE"/>
+          </a:p>
+        </p:txBody>
+      </p:sp>
+      <p:sp>
+        <p:nvSpPr>
+          <p:cNvPr id="50" name="Multiplikationszeichen 49">
+            <a:extLst>
+              <a:ext uri="{FF2B5EF4-FFF2-40B4-BE49-F238E27FC236}">
+                <a16:creationId xmlns:a16="http://schemas.microsoft.com/office/drawing/2014/main" id="{653E2B38-BDA1-582B-DD1C-4149332820B2}"/>
+              </a:ext>
+            </a:extLst>
+          </p:cNvPr>
+          <p:cNvSpPr/>
+          <p:nvPr/>
+        </p:nvSpPr>
+        <p:spPr>
+          <a:xfrm>
+            <a:off x="9860964" y="4762279"/>
+            <a:ext cx="900000" cy="900000"/>
+          </a:xfrm>
+          <a:prstGeom prst="mathMultiply">
+            <a:avLst>
+              <a:gd name="adj1" fmla="val 1663"/>
+            </a:avLst>
+          </a:prstGeom>
+          <a:noFill/>
+          <a:ln>
+            <a:solidFill>
+              <a:schemeClr val="bg1">
+                <a:lumMod val="65000"/>
+              </a:schemeClr>
+            </a:solidFill>
+          </a:ln>
+        </p:spPr>
+        <p:style>
+          <a:lnRef idx="2">
+            <a:schemeClr val="accent1">
+              <a:shade val="15000"/>
+            </a:schemeClr>
+          </a:lnRef>
+          <a:fillRef idx="1">
+            <a:schemeClr val="accent1"/>
+          </a:fillRef>
+          <a:effectRef idx="0">
+            <a:schemeClr val="accent1"/>
+          </a:effectRef>
+          <a:fontRef idx="minor">
+            <a:schemeClr val="lt1"/>
+          </a:fontRef>
+        </p:style>
+        <p:txBody>
+          <a:bodyPr rtlCol="0" anchor="ctr"/>
+          <a:lstStyle/>
+          <a:p>
+            <a:pPr algn="ctr"/>
+            <a:endParaRPr lang="de-DE"/>
+          </a:p>
+        </p:txBody>
+      </p:sp>
+    </p:spTree>
+    <p:extLst>
+      <p:ext uri="{BB962C8B-B14F-4D97-AF65-F5344CB8AC3E}">
+        <p14:creationId xmlns:p14="http://schemas.microsoft.com/office/powerpoint/2010/main" val="1103607929"/>
+      </p:ext>
+    </p:extLst>
+  </p:cSld>
+  <p:clrMapOvr>
+    <a:masterClrMapping/>
+  </p:clrMapOvr>
+</p:sld>
+</file>
+
 <file path=ppt/theme/theme1.xml><?xml version="1.0" encoding="utf-8"?>
 <a:theme xmlns:a="http://schemas.openxmlformats.org/drawingml/2006/main" name="Office">
   <a:themeElements>

</xml_diff>